<commit_message>
7SEG LED has been updated.
</commit_message>
<xml_diff>
--- a/0090_ber/rtl/schematic/ber_7seg.pptx
+++ b/0090_ber/rtl/schematic/ber_7seg.pptx
@@ -197,7 +197,7 @@
           <a:p>
             <a:fld id="{B9E5BF02-4A65-43B2-AA51-912306618617}" type="datetimeFigureOut">
               <a:rPr lang="en-US" smtClean="0"/>
-              <a:t>10/12/2017</a:t>
+              <a:t>10/25/2017</a:t>
             </a:fld>
             <a:endParaRPr lang="en-US"/>
           </a:p>
@@ -685,7 +685,7 @@
           <a:p>
             <a:fld id="{F8F920B2-3E99-4C9D-9450-62A3DEC5476B}" type="datetimeFigureOut">
               <a:rPr lang="en-US" smtClean="0"/>
-              <a:t>10/12/2017</a:t>
+              <a:t>10/25/2017</a:t>
             </a:fld>
             <a:endParaRPr lang="en-US"/>
           </a:p>
@@ -855,7 +855,7 @@
           <a:p>
             <a:fld id="{F8F920B2-3E99-4C9D-9450-62A3DEC5476B}" type="datetimeFigureOut">
               <a:rPr lang="en-US" smtClean="0"/>
-              <a:t>10/12/2017</a:t>
+              <a:t>10/25/2017</a:t>
             </a:fld>
             <a:endParaRPr lang="en-US"/>
           </a:p>
@@ -1035,7 +1035,7 @@
           <a:p>
             <a:fld id="{F8F920B2-3E99-4C9D-9450-62A3DEC5476B}" type="datetimeFigureOut">
               <a:rPr lang="en-US" smtClean="0"/>
-              <a:t>10/12/2017</a:t>
+              <a:t>10/25/2017</a:t>
             </a:fld>
             <a:endParaRPr lang="en-US"/>
           </a:p>
@@ -1205,7 +1205,7 @@
           <a:p>
             <a:fld id="{F8F920B2-3E99-4C9D-9450-62A3DEC5476B}" type="datetimeFigureOut">
               <a:rPr lang="en-US" smtClean="0"/>
-              <a:t>10/12/2017</a:t>
+              <a:t>10/25/2017</a:t>
             </a:fld>
             <a:endParaRPr lang="en-US"/>
           </a:p>
@@ -1449,7 +1449,7 @@
           <a:p>
             <a:fld id="{F8F920B2-3E99-4C9D-9450-62A3DEC5476B}" type="datetimeFigureOut">
               <a:rPr lang="en-US" smtClean="0"/>
-              <a:t>10/12/2017</a:t>
+              <a:t>10/25/2017</a:t>
             </a:fld>
             <a:endParaRPr lang="en-US"/>
           </a:p>
@@ -1681,7 +1681,7 @@
           <a:p>
             <a:fld id="{F8F920B2-3E99-4C9D-9450-62A3DEC5476B}" type="datetimeFigureOut">
               <a:rPr lang="en-US" smtClean="0"/>
-              <a:t>10/12/2017</a:t>
+              <a:t>10/25/2017</a:t>
             </a:fld>
             <a:endParaRPr lang="en-US"/>
           </a:p>
@@ -2048,7 +2048,7 @@
           <a:p>
             <a:fld id="{F8F920B2-3E99-4C9D-9450-62A3DEC5476B}" type="datetimeFigureOut">
               <a:rPr lang="en-US" smtClean="0"/>
-              <a:t>10/12/2017</a:t>
+              <a:t>10/25/2017</a:t>
             </a:fld>
             <a:endParaRPr lang="en-US"/>
           </a:p>
@@ -2166,7 +2166,7 @@
           <a:p>
             <a:fld id="{F8F920B2-3E99-4C9D-9450-62A3DEC5476B}" type="datetimeFigureOut">
               <a:rPr lang="en-US" smtClean="0"/>
-              <a:t>10/12/2017</a:t>
+              <a:t>10/25/2017</a:t>
             </a:fld>
             <a:endParaRPr lang="en-US"/>
           </a:p>
@@ -2261,7 +2261,7 @@
           <a:p>
             <a:fld id="{F8F920B2-3E99-4C9D-9450-62A3DEC5476B}" type="datetimeFigureOut">
               <a:rPr lang="en-US" smtClean="0"/>
-              <a:t>10/12/2017</a:t>
+              <a:t>10/25/2017</a:t>
             </a:fld>
             <a:endParaRPr lang="en-US"/>
           </a:p>
@@ -2538,7 +2538,7 @@
           <a:p>
             <a:fld id="{F8F920B2-3E99-4C9D-9450-62A3DEC5476B}" type="datetimeFigureOut">
               <a:rPr lang="en-US" smtClean="0"/>
-              <a:t>10/12/2017</a:t>
+              <a:t>10/25/2017</a:t>
             </a:fld>
             <a:endParaRPr lang="en-US"/>
           </a:p>
@@ -2795,7 +2795,7 @@
           <a:p>
             <a:fld id="{F8F920B2-3E99-4C9D-9450-62A3DEC5476B}" type="datetimeFigureOut">
               <a:rPr lang="en-US" smtClean="0"/>
-              <a:t>10/12/2017</a:t>
+              <a:t>10/25/2017</a:t>
             </a:fld>
             <a:endParaRPr lang="en-US"/>
           </a:p>
@@ -3008,7 +3008,7 @@
           <a:p>
             <a:fld id="{F8F920B2-3E99-4C9D-9450-62A3DEC5476B}" type="datetimeFigureOut">
               <a:rPr lang="en-US" smtClean="0"/>
-              <a:t>10/12/2017</a:t>
+              <a:t>10/25/2017</a:t>
             </a:fld>
             <a:endParaRPr lang="en-US"/>
           </a:p>
@@ -12938,8 +12938,8 @@
         </p:nvSpPr>
         <p:spPr>
           <a:xfrm>
-            <a:off x="2286001" y="914392"/>
-            <a:ext cx="609599" cy="1981200"/>
+            <a:off x="2286001" y="762000"/>
+            <a:ext cx="609599" cy="2133592"/>
           </a:xfrm>
           <a:prstGeom prst="rect">
             <a:avLst/>
@@ -14870,7 +14870,7 @@
         <p:spPr>
           <a:xfrm>
             <a:off x="7467600" y="3505192"/>
-            <a:ext cx="0" cy="3886200"/>
+            <a:ext cx="0" cy="5257808"/>
           </a:xfrm>
           <a:prstGeom prst="line">
             <a:avLst/>
@@ -14916,7 +14916,7 @@
             <a:solidFill>
               <a:srgbClr val="000000"/>
             </a:solidFill>
-            <a:headEnd type="none" w="med" len="med"/>
+            <a:headEnd type="oval" w="med" len="med"/>
             <a:tailEnd type="triangle" w="med" len="med"/>
           </a:ln>
         </p:spPr>
@@ -24186,7 +24186,7 @@
         </p:nvSpPr>
         <p:spPr>
           <a:xfrm>
-            <a:off x="16840200" y="10210792"/>
+            <a:off x="18059400" y="10058392"/>
             <a:ext cx="228600" cy="152400"/>
           </a:xfrm>
           <a:prstGeom prst="homePlate">
@@ -24237,7 +24237,7 @@
         </p:nvCxnSpPr>
         <p:spPr>
           <a:xfrm flipV="1">
-            <a:off x="16611600" y="10210792"/>
+            <a:off x="17830800" y="10058392"/>
             <a:ext cx="152400" cy="152400"/>
           </a:xfrm>
           <a:prstGeom prst="line">
@@ -24274,7 +24274,7 @@
         </p:nvSpPr>
         <p:spPr>
           <a:xfrm>
-            <a:off x="16611600" y="10134592"/>
+            <a:off x="17830800" y="9982192"/>
             <a:ext cx="152400" cy="76200"/>
           </a:xfrm>
           <a:prstGeom prst="rect">
@@ -24327,7 +24327,7 @@
         </p:nvSpPr>
         <p:spPr>
           <a:xfrm>
-            <a:off x="15849600" y="10134592"/>
+            <a:off x="17068800" y="9982192"/>
             <a:ext cx="457200" cy="152400"/>
           </a:xfrm>
           <a:prstGeom prst="rect">
@@ -24375,15 +24375,15 @@
         <p:nvCxnSpPr>
           <p:cNvPr id="736" name="Straight Connector 735"/>
           <p:cNvCxnSpPr>
-            <a:stCxn id="676" idx="3"/>
+            <a:stCxn id="590" idx="0"/>
             <a:endCxn id="732" idx="1"/>
           </p:cNvCxnSpPr>
           <p:nvPr/>
         </p:nvCxnSpPr>
         <p:spPr>
-          <a:xfrm>
-            <a:off x="15316200" y="10286992"/>
-            <a:ext cx="1524000" cy="1"/>
+          <a:xfrm flipV="1">
+            <a:off x="16764000" y="10134592"/>
+            <a:ext cx="1295400" cy="8"/>
           </a:xfrm>
           <a:prstGeom prst="line">
             <a:avLst/>
@@ -24419,7 +24419,7 @@
         </p:nvSpPr>
         <p:spPr>
           <a:xfrm>
-            <a:off x="16840200" y="10820393"/>
+            <a:off x="18059400" y="10667993"/>
             <a:ext cx="228600" cy="152400"/>
           </a:xfrm>
           <a:prstGeom prst="homePlate">
@@ -24470,7 +24470,7 @@
         </p:nvCxnSpPr>
         <p:spPr>
           <a:xfrm flipV="1">
-            <a:off x="16611600" y="10820393"/>
+            <a:off x="17830800" y="10667993"/>
             <a:ext cx="152400" cy="152400"/>
           </a:xfrm>
           <a:prstGeom prst="line">
@@ -24507,7 +24507,7 @@
         </p:nvSpPr>
         <p:spPr>
           <a:xfrm>
-            <a:off x="16611600" y="10744193"/>
+            <a:off x="17830800" y="10591793"/>
             <a:ext cx="152400" cy="76200"/>
           </a:xfrm>
           <a:prstGeom prst="rect">
@@ -24560,7 +24560,7 @@
         </p:nvSpPr>
         <p:spPr>
           <a:xfrm>
-            <a:off x="15849600" y="10744193"/>
+            <a:off x="17068800" y="10591793"/>
             <a:ext cx="457200" cy="152400"/>
           </a:xfrm>
           <a:prstGeom prst="rect">
@@ -24608,14 +24608,15 @@
         <p:nvCxnSpPr>
           <p:cNvPr id="741" name="Straight Connector 740"/>
           <p:cNvCxnSpPr>
+            <a:stCxn id="594" idx="0"/>
             <a:endCxn id="737" idx="1"/>
           </p:cNvCxnSpPr>
           <p:nvPr/>
         </p:nvCxnSpPr>
         <p:spPr>
-          <a:xfrm>
-            <a:off x="15316200" y="10896593"/>
-            <a:ext cx="1524000" cy="1"/>
+          <a:xfrm flipV="1">
+            <a:off x="16764000" y="10744193"/>
+            <a:ext cx="1295400" cy="7"/>
           </a:xfrm>
           <a:prstGeom prst="line">
             <a:avLst/>
@@ -24651,7 +24652,7 @@
         </p:nvSpPr>
         <p:spPr>
           <a:xfrm>
-            <a:off x="16840200" y="12496793"/>
+            <a:off x="18059400" y="12344400"/>
             <a:ext cx="228600" cy="152400"/>
           </a:xfrm>
           <a:prstGeom prst="homePlate">
@@ -24702,7 +24703,7 @@
         </p:nvCxnSpPr>
         <p:spPr>
           <a:xfrm flipV="1">
-            <a:off x="16611600" y="12496793"/>
+            <a:off x="17830800" y="12344400"/>
             <a:ext cx="152400" cy="152400"/>
           </a:xfrm>
           <a:prstGeom prst="line">
@@ -24739,7 +24740,7 @@
         </p:nvSpPr>
         <p:spPr>
           <a:xfrm>
-            <a:off x="16611600" y="12420593"/>
+            <a:off x="17830800" y="12268200"/>
             <a:ext cx="152400" cy="76200"/>
           </a:xfrm>
           <a:prstGeom prst="rect">
@@ -24792,7 +24793,7 @@
         </p:nvSpPr>
         <p:spPr>
           <a:xfrm>
-            <a:off x="15849600" y="12420593"/>
+            <a:off x="17068800" y="12268200"/>
             <a:ext cx="457200" cy="152400"/>
           </a:xfrm>
           <a:prstGeom prst="rect">
@@ -24840,14 +24841,15 @@
         <p:nvCxnSpPr>
           <p:cNvPr id="746" name="Straight Connector 745"/>
           <p:cNvCxnSpPr>
+            <a:stCxn id="599" idx="0"/>
             <a:endCxn id="742" idx="1"/>
           </p:cNvCxnSpPr>
           <p:nvPr/>
         </p:nvCxnSpPr>
         <p:spPr>
-          <a:xfrm>
-            <a:off x="15316200" y="12572993"/>
-            <a:ext cx="1524000" cy="1"/>
+          <a:xfrm flipV="1">
+            <a:off x="16764000" y="12420600"/>
+            <a:ext cx="1295400" cy="7"/>
           </a:xfrm>
           <a:prstGeom prst="line">
             <a:avLst/>
@@ -24883,7 +24885,7 @@
         </p:nvSpPr>
         <p:spPr>
           <a:xfrm>
-            <a:off x="16840200" y="13106393"/>
+            <a:off x="18059400" y="12954000"/>
             <a:ext cx="228600" cy="152400"/>
           </a:xfrm>
           <a:prstGeom prst="homePlate">
@@ -24934,7 +24936,7 @@
         </p:nvCxnSpPr>
         <p:spPr>
           <a:xfrm flipV="1">
-            <a:off x="16611600" y="13106393"/>
+            <a:off x="17830800" y="12954000"/>
             <a:ext cx="152400" cy="152400"/>
           </a:xfrm>
           <a:prstGeom prst="line">
@@ -24971,7 +24973,7 @@
         </p:nvSpPr>
         <p:spPr>
           <a:xfrm>
-            <a:off x="16611600" y="13030193"/>
+            <a:off x="17830800" y="12877800"/>
             <a:ext cx="152400" cy="76200"/>
           </a:xfrm>
           <a:prstGeom prst="rect">
@@ -25024,7 +25026,7 @@
         </p:nvSpPr>
         <p:spPr>
           <a:xfrm>
-            <a:off x="15849600" y="13030193"/>
+            <a:off x="17068800" y="12877800"/>
             <a:ext cx="457200" cy="152400"/>
           </a:xfrm>
           <a:prstGeom prst="rect">
@@ -25072,14 +25074,15 @@
         <p:nvCxnSpPr>
           <p:cNvPr id="751" name="Straight Connector 750"/>
           <p:cNvCxnSpPr>
+            <a:stCxn id="689" idx="0"/>
             <a:endCxn id="747" idx="1"/>
           </p:cNvCxnSpPr>
           <p:nvPr/>
         </p:nvCxnSpPr>
         <p:spPr>
-          <a:xfrm>
-            <a:off x="15316200" y="13182593"/>
-            <a:ext cx="1524000" cy="1"/>
+          <a:xfrm flipV="1">
+            <a:off x="16764000" y="13030200"/>
+            <a:ext cx="1295400" cy="7"/>
           </a:xfrm>
           <a:prstGeom prst="line">
             <a:avLst/>
@@ -25471,6 +25474,1876 @@
           </a:p>
         </p:txBody>
       </p:sp>
+      <p:cxnSp>
+        <p:nvCxnSpPr>
+          <p:cNvPr id="588" name="Straight Connector 587"/>
+          <p:cNvCxnSpPr/>
+          <p:nvPr/>
+        </p:nvCxnSpPr>
+        <p:spPr>
+          <a:xfrm>
+            <a:off x="7467600" y="8763000"/>
+            <a:ext cx="9144000" cy="0"/>
+          </a:xfrm>
+          <a:prstGeom prst="line">
+            <a:avLst/>
+          </a:prstGeom>
+          <a:ln w="12700">
+            <a:solidFill>
+              <a:srgbClr val="000000"/>
+            </a:solidFill>
+            <a:headEnd type="none" w="med" len="med"/>
+            <a:tailEnd type="triangle" w="med" len="med"/>
+          </a:ln>
+        </p:spPr>
+        <p:style>
+          <a:lnRef idx="1">
+            <a:schemeClr val="accent1"/>
+          </a:lnRef>
+          <a:fillRef idx="0">
+            <a:schemeClr val="accent1"/>
+          </a:fillRef>
+          <a:effectRef idx="0">
+            <a:schemeClr val="accent1"/>
+          </a:effectRef>
+          <a:fontRef idx="minor">
+            <a:schemeClr val="tx1"/>
+          </a:fontRef>
+        </p:style>
+      </p:cxnSp>
+      <p:sp>
+        <p:nvSpPr>
+          <p:cNvPr id="590" name="Trapezoid 589"/>
+          <p:cNvSpPr/>
+          <p:nvPr/>
+        </p:nvSpPr>
+        <p:spPr>
+          <a:xfrm rot="5400000">
+            <a:off x="16459200" y="10058400"/>
+            <a:ext cx="457200" cy="152400"/>
+          </a:xfrm>
+          <a:prstGeom prst="trapezoid">
+            <a:avLst>
+              <a:gd name="adj" fmla="val 110715"/>
+            </a:avLst>
+          </a:prstGeom>
+          <a:noFill/>
+          <a:ln w="12700">
+            <a:solidFill>
+              <a:srgbClr val="000000"/>
+            </a:solidFill>
+          </a:ln>
+        </p:spPr>
+        <p:style>
+          <a:lnRef idx="2">
+            <a:schemeClr val="accent1">
+              <a:shade val="50000"/>
+            </a:schemeClr>
+          </a:lnRef>
+          <a:fillRef idx="1">
+            <a:schemeClr val="accent1"/>
+          </a:fillRef>
+          <a:effectRef idx="0">
+            <a:schemeClr val="accent1"/>
+          </a:effectRef>
+          <a:fontRef idx="minor">
+            <a:schemeClr val="lt1"/>
+          </a:fontRef>
+        </p:style>
+        <p:txBody>
+          <a:bodyPr rtlCol="0" anchor="ctr"/>
+          <a:lstStyle/>
+          <a:p>
+            <a:pPr algn="ctr"/>
+            <a:endParaRPr lang="en-US" sz="3730"/>
+          </a:p>
+        </p:txBody>
+      </p:sp>
+      <p:sp>
+        <p:nvSpPr>
+          <p:cNvPr id="591" name="Rectangle 590"/>
+          <p:cNvSpPr/>
+          <p:nvPr/>
+        </p:nvSpPr>
+        <p:spPr>
+          <a:xfrm>
+            <a:off x="16611600" y="10134600"/>
+            <a:ext cx="152400" cy="152400"/>
+          </a:xfrm>
+          <a:prstGeom prst="rect">
+            <a:avLst/>
+          </a:prstGeom>
+          <a:noFill/>
+          <a:ln>
+            <a:noFill/>
+          </a:ln>
+        </p:spPr>
+        <p:style>
+          <a:lnRef idx="2">
+            <a:schemeClr val="accent1">
+              <a:shade val="50000"/>
+            </a:schemeClr>
+          </a:lnRef>
+          <a:fillRef idx="1">
+            <a:schemeClr val="accent1"/>
+          </a:fillRef>
+          <a:effectRef idx="0">
+            <a:schemeClr val="accent1"/>
+          </a:effectRef>
+          <a:fontRef idx="minor">
+            <a:schemeClr val="lt1"/>
+          </a:fontRef>
+        </p:style>
+        <p:txBody>
+          <a:bodyPr wrap="none" lIns="45720" rIns="45720" rtlCol="0" anchor="ctr"/>
+          <a:lstStyle/>
+          <a:p>
+            <a:r>
+              <a:rPr lang="en-US" sz="900" dirty="0">
+                <a:solidFill>
+                  <a:srgbClr val="000000"/>
+                </a:solidFill>
+                <a:latin typeface="Courier New" panose="02070309020205020404" pitchFamily="49" charset="0"/>
+                <a:cs typeface="Courier New" panose="02070309020205020404" pitchFamily="49" charset="0"/>
+              </a:rPr>
+              <a:t>0</a:t>
+            </a:r>
+          </a:p>
+        </p:txBody>
+      </p:sp>
+      <p:sp>
+        <p:nvSpPr>
+          <p:cNvPr id="593" name="Rectangle 592"/>
+          <p:cNvSpPr/>
+          <p:nvPr/>
+        </p:nvSpPr>
+        <p:spPr>
+          <a:xfrm>
+            <a:off x="16611600" y="9982200"/>
+            <a:ext cx="152400" cy="152400"/>
+          </a:xfrm>
+          <a:prstGeom prst="rect">
+            <a:avLst/>
+          </a:prstGeom>
+          <a:noFill/>
+          <a:ln>
+            <a:noFill/>
+          </a:ln>
+        </p:spPr>
+        <p:style>
+          <a:lnRef idx="2">
+            <a:schemeClr val="accent1">
+              <a:shade val="50000"/>
+            </a:schemeClr>
+          </a:lnRef>
+          <a:fillRef idx="1">
+            <a:schemeClr val="accent1"/>
+          </a:fillRef>
+          <a:effectRef idx="0">
+            <a:schemeClr val="accent1"/>
+          </a:effectRef>
+          <a:fontRef idx="minor">
+            <a:schemeClr val="lt1"/>
+          </a:fontRef>
+        </p:style>
+        <p:txBody>
+          <a:bodyPr wrap="none" lIns="45720" rIns="45720" rtlCol="0" anchor="ctr"/>
+          <a:lstStyle/>
+          <a:p>
+            <a:r>
+              <a:rPr lang="en-US" sz="900" dirty="0">
+                <a:solidFill>
+                  <a:srgbClr val="000000"/>
+                </a:solidFill>
+                <a:latin typeface="Courier New" panose="02070309020205020404" pitchFamily="49" charset="0"/>
+                <a:cs typeface="Courier New" panose="02070309020205020404" pitchFamily="49" charset="0"/>
+              </a:rPr>
+              <a:t>1</a:t>
+            </a:r>
+          </a:p>
+        </p:txBody>
+      </p:sp>
+      <p:sp>
+        <p:nvSpPr>
+          <p:cNvPr id="594" name="Trapezoid 593"/>
+          <p:cNvSpPr/>
+          <p:nvPr/>
+        </p:nvSpPr>
+        <p:spPr>
+          <a:xfrm rot="5400000">
+            <a:off x="16459200" y="10668000"/>
+            <a:ext cx="457200" cy="152400"/>
+          </a:xfrm>
+          <a:prstGeom prst="trapezoid">
+            <a:avLst>
+              <a:gd name="adj" fmla="val 110715"/>
+            </a:avLst>
+          </a:prstGeom>
+          <a:noFill/>
+          <a:ln w="12700">
+            <a:solidFill>
+              <a:srgbClr val="000000"/>
+            </a:solidFill>
+          </a:ln>
+        </p:spPr>
+        <p:style>
+          <a:lnRef idx="2">
+            <a:schemeClr val="accent1">
+              <a:shade val="50000"/>
+            </a:schemeClr>
+          </a:lnRef>
+          <a:fillRef idx="1">
+            <a:schemeClr val="accent1"/>
+          </a:fillRef>
+          <a:effectRef idx="0">
+            <a:schemeClr val="accent1"/>
+          </a:effectRef>
+          <a:fontRef idx="minor">
+            <a:schemeClr val="lt1"/>
+          </a:fontRef>
+        </p:style>
+        <p:txBody>
+          <a:bodyPr rtlCol="0" anchor="ctr"/>
+          <a:lstStyle/>
+          <a:p>
+            <a:pPr algn="ctr"/>
+            <a:endParaRPr lang="en-US" sz="3730"/>
+          </a:p>
+        </p:txBody>
+      </p:sp>
+      <p:sp>
+        <p:nvSpPr>
+          <p:cNvPr id="597" name="Rectangle 596"/>
+          <p:cNvSpPr/>
+          <p:nvPr/>
+        </p:nvSpPr>
+        <p:spPr>
+          <a:xfrm>
+            <a:off x="16611600" y="10744200"/>
+            <a:ext cx="152400" cy="152400"/>
+          </a:xfrm>
+          <a:prstGeom prst="rect">
+            <a:avLst/>
+          </a:prstGeom>
+          <a:noFill/>
+          <a:ln>
+            <a:noFill/>
+          </a:ln>
+        </p:spPr>
+        <p:style>
+          <a:lnRef idx="2">
+            <a:schemeClr val="accent1">
+              <a:shade val="50000"/>
+            </a:schemeClr>
+          </a:lnRef>
+          <a:fillRef idx="1">
+            <a:schemeClr val="accent1"/>
+          </a:fillRef>
+          <a:effectRef idx="0">
+            <a:schemeClr val="accent1"/>
+          </a:effectRef>
+          <a:fontRef idx="minor">
+            <a:schemeClr val="lt1"/>
+          </a:fontRef>
+        </p:style>
+        <p:txBody>
+          <a:bodyPr wrap="none" lIns="45720" rIns="45720" rtlCol="0" anchor="ctr"/>
+          <a:lstStyle/>
+          <a:p>
+            <a:r>
+              <a:rPr lang="en-US" sz="900" dirty="0">
+                <a:solidFill>
+                  <a:srgbClr val="000000"/>
+                </a:solidFill>
+                <a:latin typeface="Courier New" panose="02070309020205020404" pitchFamily="49" charset="0"/>
+                <a:cs typeface="Courier New" panose="02070309020205020404" pitchFamily="49" charset="0"/>
+              </a:rPr>
+              <a:t>0</a:t>
+            </a:r>
+          </a:p>
+        </p:txBody>
+      </p:sp>
+      <p:sp>
+        <p:nvSpPr>
+          <p:cNvPr id="598" name="Rectangle 597"/>
+          <p:cNvSpPr/>
+          <p:nvPr/>
+        </p:nvSpPr>
+        <p:spPr>
+          <a:xfrm>
+            <a:off x="16611600" y="10591800"/>
+            <a:ext cx="152400" cy="152400"/>
+          </a:xfrm>
+          <a:prstGeom prst="rect">
+            <a:avLst/>
+          </a:prstGeom>
+          <a:noFill/>
+          <a:ln>
+            <a:noFill/>
+          </a:ln>
+        </p:spPr>
+        <p:style>
+          <a:lnRef idx="2">
+            <a:schemeClr val="accent1">
+              <a:shade val="50000"/>
+            </a:schemeClr>
+          </a:lnRef>
+          <a:fillRef idx="1">
+            <a:schemeClr val="accent1"/>
+          </a:fillRef>
+          <a:effectRef idx="0">
+            <a:schemeClr val="accent1"/>
+          </a:effectRef>
+          <a:fontRef idx="minor">
+            <a:schemeClr val="lt1"/>
+          </a:fontRef>
+        </p:style>
+        <p:txBody>
+          <a:bodyPr wrap="none" lIns="45720" rIns="45720" rtlCol="0" anchor="ctr"/>
+          <a:lstStyle/>
+          <a:p>
+            <a:r>
+              <a:rPr lang="en-US" sz="900" dirty="0">
+                <a:solidFill>
+                  <a:srgbClr val="000000"/>
+                </a:solidFill>
+                <a:latin typeface="Courier New" panose="02070309020205020404" pitchFamily="49" charset="0"/>
+                <a:cs typeface="Courier New" panose="02070309020205020404" pitchFamily="49" charset="0"/>
+              </a:rPr>
+              <a:t>1</a:t>
+            </a:r>
+          </a:p>
+        </p:txBody>
+      </p:sp>
+      <p:sp>
+        <p:nvSpPr>
+          <p:cNvPr id="599" name="Trapezoid 598"/>
+          <p:cNvSpPr/>
+          <p:nvPr/>
+        </p:nvSpPr>
+        <p:spPr>
+          <a:xfrm rot="5400000">
+            <a:off x="16459200" y="12344407"/>
+            <a:ext cx="457200" cy="152400"/>
+          </a:xfrm>
+          <a:prstGeom prst="trapezoid">
+            <a:avLst>
+              <a:gd name="adj" fmla="val 110715"/>
+            </a:avLst>
+          </a:prstGeom>
+          <a:noFill/>
+          <a:ln w="12700">
+            <a:solidFill>
+              <a:srgbClr val="000000"/>
+            </a:solidFill>
+          </a:ln>
+        </p:spPr>
+        <p:style>
+          <a:lnRef idx="2">
+            <a:schemeClr val="accent1">
+              <a:shade val="50000"/>
+            </a:schemeClr>
+          </a:lnRef>
+          <a:fillRef idx="1">
+            <a:schemeClr val="accent1"/>
+          </a:fillRef>
+          <a:effectRef idx="0">
+            <a:schemeClr val="accent1"/>
+          </a:effectRef>
+          <a:fontRef idx="minor">
+            <a:schemeClr val="lt1"/>
+          </a:fontRef>
+        </p:style>
+        <p:txBody>
+          <a:bodyPr rtlCol="0" anchor="ctr"/>
+          <a:lstStyle/>
+          <a:p>
+            <a:pPr algn="ctr"/>
+            <a:endParaRPr lang="en-US" sz="3730"/>
+          </a:p>
+        </p:txBody>
+      </p:sp>
+      <p:sp>
+        <p:nvSpPr>
+          <p:cNvPr id="665" name="Rectangle 664"/>
+          <p:cNvSpPr/>
+          <p:nvPr/>
+        </p:nvSpPr>
+        <p:spPr>
+          <a:xfrm>
+            <a:off x="16611600" y="12420607"/>
+            <a:ext cx="152400" cy="152400"/>
+          </a:xfrm>
+          <a:prstGeom prst="rect">
+            <a:avLst/>
+          </a:prstGeom>
+          <a:noFill/>
+          <a:ln>
+            <a:noFill/>
+          </a:ln>
+        </p:spPr>
+        <p:style>
+          <a:lnRef idx="2">
+            <a:schemeClr val="accent1">
+              <a:shade val="50000"/>
+            </a:schemeClr>
+          </a:lnRef>
+          <a:fillRef idx="1">
+            <a:schemeClr val="accent1"/>
+          </a:fillRef>
+          <a:effectRef idx="0">
+            <a:schemeClr val="accent1"/>
+          </a:effectRef>
+          <a:fontRef idx="minor">
+            <a:schemeClr val="lt1"/>
+          </a:fontRef>
+        </p:style>
+        <p:txBody>
+          <a:bodyPr wrap="none" lIns="45720" rIns="45720" rtlCol="0" anchor="ctr"/>
+          <a:lstStyle/>
+          <a:p>
+            <a:r>
+              <a:rPr lang="en-US" sz="900" dirty="0">
+                <a:solidFill>
+                  <a:srgbClr val="000000"/>
+                </a:solidFill>
+                <a:latin typeface="Courier New" panose="02070309020205020404" pitchFamily="49" charset="0"/>
+                <a:cs typeface="Courier New" panose="02070309020205020404" pitchFamily="49" charset="0"/>
+              </a:rPr>
+              <a:t>0</a:t>
+            </a:r>
+          </a:p>
+        </p:txBody>
+      </p:sp>
+      <p:sp>
+        <p:nvSpPr>
+          <p:cNvPr id="680" name="Rectangle 679"/>
+          <p:cNvSpPr/>
+          <p:nvPr/>
+        </p:nvSpPr>
+        <p:spPr>
+          <a:xfrm>
+            <a:off x="16611600" y="12268207"/>
+            <a:ext cx="152400" cy="152400"/>
+          </a:xfrm>
+          <a:prstGeom prst="rect">
+            <a:avLst/>
+          </a:prstGeom>
+          <a:noFill/>
+          <a:ln>
+            <a:noFill/>
+          </a:ln>
+        </p:spPr>
+        <p:style>
+          <a:lnRef idx="2">
+            <a:schemeClr val="accent1">
+              <a:shade val="50000"/>
+            </a:schemeClr>
+          </a:lnRef>
+          <a:fillRef idx="1">
+            <a:schemeClr val="accent1"/>
+          </a:fillRef>
+          <a:effectRef idx="0">
+            <a:schemeClr val="accent1"/>
+          </a:effectRef>
+          <a:fontRef idx="minor">
+            <a:schemeClr val="lt1"/>
+          </a:fontRef>
+        </p:style>
+        <p:txBody>
+          <a:bodyPr wrap="none" lIns="45720" rIns="45720" rtlCol="0" anchor="ctr"/>
+          <a:lstStyle/>
+          <a:p>
+            <a:r>
+              <a:rPr lang="en-US" sz="900" dirty="0">
+                <a:solidFill>
+                  <a:srgbClr val="000000"/>
+                </a:solidFill>
+                <a:latin typeface="Courier New" panose="02070309020205020404" pitchFamily="49" charset="0"/>
+                <a:cs typeface="Courier New" panose="02070309020205020404" pitchFamily="49" charset="0"/>
+              </a:rPr>
+              <a:t>1</a:t>
+            </a:r>
+          </a:p>
+        </p:txBody>
+      </p:sp>
+      <p:sp>
+        <p:nvSpPr>
+          <p:cNvPr id="689" name="Trapezoid 688"/>
+          <p:cNvSpPr/>
+          <p:nvPr/>
+        </p:nvSpPr>
+        <p:spPr>
+          <a:xfrm rot="5400000">
+            <a:off x="16459200" y="12954007"/>
+            <a:ext cx="457200" cy="152400"/>
+          </a:xfrm>
+          <a:prstGeom prst="trapezoid">
+            <a:avLst>
+              <a:gd name="adj" fmla="val 110715"/>
+            </a:avLst>
+          </a:prstGeom>
+          <a:noFill/>
+          <a:ln w="12700">
+            <a:solidFill>
+              <a:srgbClr val="000000"/>
+            </a:solidFill>
+          </a:ln>
+        </p:spPr>
+        <p:style>
+          <a:lnRef idx="2">
+            <a:schemeClr val="accent1">
+              <a:shade val="50000"/>
+            </a:schemeClr>
+          </a:lnRef>
+          <a:fillRef idx="1">
+            <a:schemeClr val="accent1"/>
+          </a:fillRef>
+          <a:effectRef idx="0">
+            <a:schemeClr val="accent1"/>
+          </a:effectRef>
+          <a:fontRef idx="minor">
+            <a:schemeClr val="lt1"/>
+          </a:fontRef>
+        </p:style>
+        <p:txBody>
+          <a:bodyPr rtlCol="0" anchor="ctr"/>
+          <a:lstStyle/>
+          <a:p>
+            <a:pPr algn="ctr"/>
+            <a:endParaRPr lang="en-US" sz="3730"/>
+          </a:p>
+        </p:txBody>
+      </p:sp>
+      <p:sp>
+        <p:nvSpPr>
+          <p:cNvPr id="691" name="Rectangle 690"/>
+          <p:cNvSpPr/>
+          <p:nvPr/>
+        </p:nvSpPr>
+        <p:spPr>
+          <a:xfrm>
+            <a:off x="16611600" y="13030207"/>
+            <a:ext cx="152400" cy="152400"/>
+          </a:xfrm>
+          <a:prstGeom prst="rect">
+            <a:avLst/>
+          </a:prstGeom>
+          <a:noFill/>
+          <a:ln>
+            <a:noFill/>
+          </a:ln>
+        </p:spPr>
+        <p:style>
+          <a:lnRef idx="2">
+            <a:schemeClr val="accent1">
+              <a:shade val="50000"/>
+            </a:schemeClr>
+          </a:lnRef>
+          <a:fillRef idx="1">
+            <a:schemeClr val="accent1"/>
+          </a:fillRef>
+          <a:effectRef idx="0">
+            <a:schemeClr val="accent1"/>
+          </a:effectRef>
+          <a:fontRef idx="minor">
+            <a:schemeClr val="lt1"/>
+          </a:fontRef>
+        </p:style>
+        <p:txBody>
+          <a:bodyPr wrap="none" lIns="45720" rIns="45720" rtlCol="0" anchor="ctr"/>
+          <a:lstStyle/>
+          <a:p>
+            <a:r>
+              <a:rPr lang="en-US" sz="900" dirty="0">
+                <a:solidFill>
+                  <a:srgbClr val="000000"/>
+                </a:solidFill>
+                <a:latin typeface="Courier New" panose="02070309020205020404" pitchFamily="49" charset="0"/>
+                <a:cs typeface="Courier New" panose="02070309020205020404" pitchFamily="49" charset="0"/>
+              </a:rPr>
+              <a:t>0</a:t>
+            </a:r>
+          </a:p>
+        </p:txBody>
+      </p:sp>
+      <p:sp>
+        <p:nvSpPr>
+          <p:cNvPr id="693" name="Rectangle 692"/>
+          <p:cNvSpPr/>
+          <p:nvPr/>
+        </p:nvSpPr>
+        <p:spPr>
+          <a:xfrm>
+            <a:off x="16611600" y="12877807"/>
+            <a:ext cx="152400" cy="152400"/>
+          </a:xfrm>
+          <a:prstGeom prst="rect">
+            <a:avLst/>
+          </a:prstGeom>
+          <a:noFill/>
+          <a:ln>
+            <a:noFill/>
+          </a:ln>
+        </p:spPr>
+        <p:style>
+          <a:lnRef idx="2">
+            <a:schemeClr val="accent1">
+              <a:shade val="50000"/>
+            </a:schemeClr>
+          </a:lnRef>
+          <a:fillRef idx="1">
+            <a:schemeClr val="accent1"/>
+          </a:fillRef>
+          <a:effectRef idx="0">
+            <a:schemeClr val="accent1"/>
+          </a:effectRef>
+          <a:fontRef idx="minor">
+            <a:schemeClr val="lt1"/>
+          </a:fontRef>
+        </p:style>
+        <p:txBody>
+          <a:bodyPr wrap="none" lIns="45720" rIns="45720" rtlCol="0" anchor="ctr"/>
+          <a:lstStyle/>
+          <a:p>
+            <a:r>
+              <a:rPr lang="en-US" sz="900" dirty="0">
+                <a:solidFill>
+                  <a:srgbClr val="000000"/>
+                </a:solidFill>
+                <a:latin typeface="Courier New" panose="02070309020205020404" pitchFamily="49" charset="0"/>
+                <a:cs typeface="Courier New" panose="02070309020205020404" pitchFamily="49" charset="0"/>
+              </a:rPr>
+              <a:t>1</a:t>
+            </a:r>
+          </a:p>
+        </p:txBody>
+      </p:sp>
+      <p:cxnSp>
+        <p:nvCxnSpPr>
+          <p:cNvPr id="699" name="Straight Connector 698"/>
+          <p:cNvCxnSpPr/>
+          <p:nvPr/>
+        </p:nvCxnSpPr>
+        <p:spPr>
+          <a:xfrm flipV="1">
+            <a:off x="16306800" y="9982200"/>
+            <a:ext cx="304800" cy="1"/>
+          </a:xfrm>
+          <a:prstGeom prst="line">
+            <a:avLst/>
+          </a:prstGeom>
+          <a:ln w="12700">
+            <a:solidFill>
+              <a:srgbClr val="000000"/>
+            </a:solidFill>
+            <a:headEnd type="none" w="med" len="med"/>
+            <a:tailEnd type="none" w="med" len="med"/>
+          </a:ln>
+        </p:spPr>
+        <p:style>
+          <a:lnRef idx="1">
+            <a:schemeClr val="accent1"/>
+          </a:lnRef>
+          <a:fillRef idx="0">
+            <a:schemeClr val="accent1"/>
+          </a:fillRef>
+          <a:effectRef idx="0">
+            <a:schemeClr val="accent1"/>
+          </a:effectRef>
+          <a:fontRef idx="minor">
+            <a:schemeClr val="tx1"/>
+          </a:fontRef>
+        </p:style>
+      </p:cxnSp>
+      <p:sp>
+        <p:nvSpPr>
+          <p:cNvPr id="701" name="Rectangle 700"/>
+          <p:cNvSpPr/>
+          <p:nvPr/>
+        </p:nvSpPr>
+        <p:spPr>
+          <a:xfrm>
+            <a:off x="15697200" y="9829793"/>
+            <a:ext cx="457200" cy="152399"/>
+          </a:xfrm>
+          <a:prstGeom prst="rect">
+            <a:avLst/>
+          </a:prstGeom>
+          <a:noFill/>
+          <a:ln>
+            <a:noFill/>
+          </a:ln>
+        </p:spPr>
+        <p:style>
+          <a:lnRef idx="2">
+            <a:schemeClr val="accent1">
+              <a:shade val="50000"/>
+            </a:schemeClr>
+          </a:lnRef>
+          <a:fillRef idx="1">
+            <a:schemeClr val="accent1"/>
+          </a:fillRef>
+          <a:effectRef idx="0">
+            <a:schemeClr val="accent1"/>
+          </a:effectRef>
+          <a:fontRef idx="minor">
+            <a:schemeClr val="lt1"/>
+          </a:fontRef>
+        </p:style>
+        <p:txBody>
+          <a:bodyPr wrap="none" lIns="45720" rIns="45720" rtlCol="0" anchor="ctr"/>
+          <a:lstStyle/>
+          <a:p>
+            <a:r>
+              <a:rPr lang="en-US" sz="900" dirty="0" smtClean="0">
+                <a:solidFill>
+                  <a:srgbClr val="000000"/>
+                </a:solidFill>
+                <a:latin typeface="Courier New" panose="02070309020205020404" pitchFamily="49" charset="0"/>
+                <a:cs typeface="Courier New" panose="02070309020205020404" pitchFamily="49" charset="0"/>
+              </a:rPr>
+              <a:t>7’b1010100</a:t>
+            </a:r>
+            <a:endParaRPr lang="en-US" sz="900" dirty="0">
+              <a:solidFill>
+                <a:srgbClr val="000000"/>
+              </a:solidFill>
+              <a:latin typeface="Courier New" panose="02070309020205020404" pitchFamily="49" charset="0"/>
+              <a:cs typeface="Courier New" panose="02070309020205020404" pitchFamily="49" charset="0"/>
+            </a:endParaRPr>
+          </a:p>
+        </p:txBody>
+      </p:sp>
+      <p:sp>
+        <p:nvSpPr>
+          <p:cNvPr id="702" name="Rectangle 701"/>
+          <p:cNvSpPr/>
+          <p:nvPr/>
+        </p:nvSpPr>
+        <p:spPr>
+          <a:xfrm>
+            <a:off x="15697200" y="9982201"/>
+            <a:ext cx="457200" cy="152399"/>
+          </a:xfrm>
+          <a:prstGeom prst="rect">
+            <a:avLst/>
+          </a:prstGeom>
+          <a:noFill/>
+          <a:ln>
+            <a:noFill/>
+          </a:ln>
+        </p:spPr>
+        <p:style>
+          <a:lnRef idx="2">
+            <a:schemeClr val="accent1">
+              <a:shade val="50000"/>
+            </a:schemeClr>
+          </a:lnRef>
+          <a:fillRef idx="1">
+            <a:schemeClr val="accent1"/>
+          </a:fillRef>
+          <a:effectRef idx="0">
+            <a:schemeClr val="accent1"/>
+          </a:effectRef>
+          <a:fontRef idx="minor">
+            <a:schemeClr val="lt1"/>
+          </a:fontRef>
+        </p:style>
+        <p:txBody>
+          <a:bodyPr wrap="none" lIns="45720" rIns="45720" rtlCol="0" anchor="ctr"/>
+          <a:lstStyle/>
+          <a:p>
+            <a:r>
+              <a:rPr lang="en-US" sz="900" dirty="0" smtClean="0">
+                <a:solidFill>
+                  <a:srgbClr val="000000"/>
+                </a:solidFill>
+                <a:latin typeface="Courier New" panose="02070309020205020404" pitchFamily="49" charset="0"/>
+                <a:cs typeface="Courier New" panose="02070309020205020404" pitchFamily="49" charset="0"/>
+              </a:rPr>
+              <a:t>(n)</a:t>
+            </a:r>
+            <a:endParaRPr lang="en-US" sz="900" dirty="0">
+              <a:solidFill>
+                <a:srgbClr val="000000"/>
+              </a:solidFill>
+              <a:latin typeface="Courier New" panose="02070309020205020404" pitchFamily="49" charset="0"/>
+              <a:cs typeface="Courier New" panose="02070309020205020404" pitchFamily="49" charset="0"/>
+            </a:endParaRPr>
+          </a:p>
+        </p:txBody>
+      </p:sp>
+      <p:cxnSp>
+        <p:nvCxnSpPr>
+          <p:cNvPr id="703" name="Straight Connector 702"/>
+          <p:cNvCxnSpPr/>
+          <p:nvPr/>
+        </p:nvCxnSpPr>
+        <p:spPr>
+          <a:xfrm flipV="1">
+            <a:off x="16306800" y="10591799"/>
+            <a:ext cx="304800" cy="1"/>
+          </a:xfrm>
+          <a:prstGeom prst="line">
+            <a:avLst/>
+          </a:prstGeom>
+          <a:ln w="12700">
+            <a:solidFill>
+              <a:srgbClr val="000000"/>
+            </a:solidFill>
+            <a:headEnd type="none" w="med" len="med"/>
+            <a:tailEnd type="none" w="med" len="med"/>
+          </a:ln>
+        </p:spPr>
+        <p:style>
+          <a:lnRef idx="1">
+            <a:schemeClr val="accent1"/>
+          </a:lnRef>
+          <a:fillRef idx="0">
+            <a:schemeClr val="accent1"/>
+          </a:fillRef>
+          <a:effectRef idx="0">
+            <a:schemeClr val="accent1"/>
+          </a:effectRef>
+          <a:fontRef idx="minor">
+            <a:schemeClr val="tx1"/>
+          </a:fontRef>
+        </p:style>
+      </p:cxnSp>
+      <p:sp>
+        <p:nvSpPr>
+          <p:cNvPr id="704" name="Rectangle 703"/>
+          <p:cNvSpPr/>
+          <p:nvPr/>
+        </p:nvSpPr>
+        <p:spPr>
+          <a:xfrm>
+            <a:off x="15697200" y="10439392"/>
+            <a:ext cx="457200" cy="152399"/>
+          </a:xfrm>
+          <a:prstGeom prst="rect">
+            <a:avLst/>
+          </a:prstGeom>
+          <a:noFill/>
+          <a:ln>
+            <a:noFill/>
+          </a:ln>
+        </p:spPr>
+        <p:style>
+          <a:lnRef idx="2">
+            <a:schemeClr val="accent1">
+              <a:shade val="50000"/>
+            </a:schemeClr>
+          </a:lnRef>
+          <a:fillRef idx="1">
+            <a:schemeClr val="accent1"/>
+          </a:fillRef>
+          <a:effectRef idx="0">
+            <a:schemeClr val="accent1"/>
+          </a:effectRef>
+          <a:fontRef idx="minor">
+            <a:schemeClr val="lt1"/>
+          </a:fontRef>
+        </p:style>
+        <p:txBody>
+          <a:bodyPr wrap="none" lIns="45720" rIns="45720" rtlCol="0" anchor="ctr"/>
+          <a:lstStyle/>
+          <a:p>
+            <a:r>
+              <a:rPr lang="en-US" sz="900" dirty="0" smtClean="0">
+                <a:solidFill>
+                  <a:srgbClr val="000000"/>
+                </a:solidFill>
+                <a:latin typeface="Courier New" panose="02070309020205020404" pitchFamily="49" charset="0"/>
+                <a:cs typeface="Courier New" panose="02070309020205020404" pitchFamily="49" charset="0"/>
+              </a:rPr>
+              <a:t>7’b1011100</a:t>
+            </a:r>
+            <a:endParaRPr lang="en-US" sz="900" dirty="0">
+              <a:solidFill>
+                <a:srgbClr val="000000"/>
+              </a:solidFill>
+              <a:latin typeface="Courier New" panose="02070309020205020404" pitchFamily="49" charset="0"/>
+              <a:cs typeface="Courier New" panose="02070309020205020404" pitchFamily="49" charset="0"/>
+            </a:endParaRPr>
+          </a:p>
+        </p:txBody>
+      </p:sp>
+      <p:sp>
+        <p:nvSpPr>
+          <p:cNvPr id="705" name="Rectangle 704"/>
+          <p:cNvSpPr/>
+          <p:nvPr/>
+        </p:nvSpPr>
+        <p:spPr>
+          <a:xfrm>
+            <a:off x="15697200" y="10591801"/>
+            <a:ext cx="457200" cy="152399"/>
+          </a:xfrm>
+          <a:prstGeom prst="rect">
+            <a:avLst/>
+          </a:prstGeom>
+          <a:noFill/>
+          <a:ln>
+            <a:noFill/>
+          </a:ln>
+        </p:spPr>
+        <p:style>
+          <a:lnRef idx="2">
+            <a:schemeClr val="accent1">
+              <a:shade val="50000"/>
+            </a:schemeClr>
+          </a:lnRef>
+          <a:fillRef idx="1">
+            <a:schemeClr val="accent1"/>
+          </a:fillRef>
+          <a:effectRef idx="0">
+            <a:schemeClr val="accent1"/>
+          </a:effectRef>
+          <a:fontRef idx="minor">
+            <a:schemeClr val="lt1"/>
+          </a:fontRef>
+        </p:style>
+        <p:txBody>
+          <a:bodyPr wrap="none" lIns="45720" rIns="45720" rtlCol="0" anchor="ctr"/>
+          <a:lstStyle/>
+          <a:p>
+            <a:r>
+              <a:rPr lang="en-US" sz="900" dirty="0" smtClean="0">
+                <a:solidFill>
+                  <a:srgbClr val="000000"/>
+                </a:solidFill>
+                <a:latin typeface="Courier New" panose="02070309020205020404" pitchFamily="49" charset="0"/>
+                <a:cs typeface="Courier New" panose="02070309020205020404" pitchFamily="49" charset="0"/>
+              </a:rPr>
+              <a:t>(o)</a:t>
+            </a:r>
+            <a:endParaRPr lang="en-US" sz="900" dirty="0">
+              <a:solidFill>
+                <a:srgbClr val="000000"/>
+              </a:solidFill>
+              <a:latin typeface="Courier New" panose="02070309020205020404" pitchFamily="49" charset="0"/>
+              <a:cs typeface="Courier New" panose="02070309020205020404" pitchFamily="49" charset="0"/>
+            </a:endParaRPr>
+          </a:p>
+        </p:txBody>
+      </p:sp>
+      <p:cxnSp>
+        <p:nvCxnSpPr>
+          <p:cNvPr id="756" name="Straight Connector 755"/>
+          <p:cNvCxnSpPr/>
+          <p:nvPr/>
+        </p:nvCxnSpPr>
+        <p:spPr>
+          <a:xfrm flipV="1">
+            <a:off x="16306800" y="12268207"/>
+            <a:ext cx="304800" cy="1"/>
+          </a:xfrm>
+          <a:prstGeom prst="line">
+            <a:avLst/>
+          </a:prstGeom>
+          <a:ln w="12700">
+            <a:solidFill>
+              <a:srgbClr val="000000"/>
+            </a:solidFill>
+            <a:headEnd type="none" w="med" len="med"/>
+            <a:tailEnd type="none" w="med" len="med"/>
+          </a:ln>
+        </p:spPr>
+        <p:style>
+          <a:lnRef idx="1">
+            <a:schemeClr val="accent1"/>
+          </a:lnRef>
+          <a:fillRef idx="0">
+            <a:schemeClr val="accent1"/>
+          </a:fillRef>
+          <a:effectRef idx="0">
+            <a:schemeClr val="accent1"/>
+          </a:effectRef>
+          <a:fontRef idx="minor">
+            <a:schemeClr val="tx1"/>
+          </a:fontRef>
+        </p:style>
+      </p:cxnSp>
+      <p:sp>
+        <p:nvSpPr>
+          <p:cNvPr id="757" name="Rectangle 756"/>
+          <p:cNvSpPr/>
+          <p:nvPr/>
+        </p:nvSpPr>
+        <p:spPr>
+          <a:xfrm>
+            <a:off x="15697200" y="12115800"/>
+            <a:ext cx="457200" cy="152399"/>
+          </a:xfrm>
+          <a:prstGeom prst="rect">
+            <a:avLst/>
+          </a:prstGeom>
+          <a:noFill/>
+          <a:ln>
+            <a:noFill/>
+          </a:ln>
+        </p:spPr>
+        <p:style>
+          <a:lnRef idx="2">
+            <a:schemeClr val="accent1">
+              <a:shade val="50000"/>
+            </a:schemeClr>
+          </a:lnRef>
+          <a:fillRef idx="1">
+            <a:schemeClr val="accent1"/>
+          </a:fillRef>
+          <a:effectRef idx="0">
+            <a:schemeClr val="accent1"/>
+          </a:effectRef>
+          <a:fontRef idx="minor">
+            <a:schemeClr val="lt1"/>
+          </a:fontRef>
+        </p:style>
+        <p:txBody>
+          <a:bodyPr wrap="none" lIns="45720" rIns="45720" rtlCol="0" anchor="ctr"/>
+          <a:lstStyle/>
+          <a:p>
+            <a:r>
+              <a:rPr lang="en-US" sz="900" dirty="0" smtClean="0">
+                <a:solidFill>
+                  <a:srgbClr val="000000"/>
+                </a:solidFill>
+                <a:latin typeface="Courier New" panose="02070309020205020404" pitchFamily="49" charset="0"/>
+                <a:cs typeface="Courier New" panose="02070309020205020404" pitchFamily="49" charset="0"/>
+              </a:rPr>
+              <a:t>7’b1011110</a:t>
+            </a:r>
+            <a:endParaRPr lang="en-US" sz="900" dirty="0">
+              <a:solidFill>
+                <a:srgbClr val="000000"/>
+              </a:solidFill>
+              <a:latin typeface="Courier New" panose="02070309020205020404" pitchFamily="49" charset="0"/>
+              <a:cs typeface="Courier New" panose="02070309020205020404" pitchFamily="49" charset="0"/>
+            </a:endParaRPr>
+          </a:p>
+        </p:txBody>
+      </p:sp>
+      <p:sp>
+        <p:nvSpPr>
+          <p:cNvPr id="758" name="Rectangle 757"/>
+          <p:cNvSpPr/>
+          <p:nvPr/>
+        </p:nvSpPr>
+        <p:spPr>
+          <a:xfrm>
+            <a:off x="15697200" y="12268208"/>
+            <a:ext cx="457200" cy="152399"/>
+          </a:xfrm>
+          <a:prstGeom prst="rect">
+            <a:avLst/>
+          </a:prstGeom>
+          <a:noFill/>
+          <a:ln>
+            <a:noFill/>
+          </a:ln>
+        </p:spPr>
+        <p:style>
+          <a:lnRef idx="2">
+            <a:schemeClr val="accent1">
+              <a:shade val="50000"/>
+            </a:schemeClr>
+          </a:lnRef>
+          <a:fillRef idx="1">
+            <a:schemeClr val="accent1"/>
+          </a:fillRef>
+          <a:effectRef idx="0">
+            <a:schemeClr val="accent1"/>
+          </a:effectRef>
+          <a:fontRef idx="minor">
+            <a:schemeClr val="lt1"/>
+          </a:fontRef>
+        </p:style>
+        <p:txBody>
+          <a:bodyPr wrap="none" lIns="45720" rIns="45720" rtlCol="0" anchor="ctr"/>
+          <a:lstStyle/>
+          <a:p>
+            <a:r>
+              <a:rPr lang="en-US" sz="900" dirty="0" smtClean="0">
+                <a:solidFill>
+                  <a:srgbClr val="000000"/>
+                </a:solidFill>
+                <a:latin typeface="Courier New" panose="02070309020205020404" pitchFamily="49" charset="0"/>
+                <a:cs typeface="Courier New" panose="02070309020205020404" pitchFamily="49" charset="0"/>
+              </a:rPr>
+              <a:t>(d)</a:t>
+            </a:r>
+            <a:endParaRPr lang="en-US" sz="900" dirty="0">
+              <a:solidFill>
+                <a:srgbClr val="000000"/>
+              </a:solidFill>
+              <a:latin typeface="Courier New" panose="02070309020205020404" pitchFamily="49" charset="0"/>
+              <a:cs typeface="Courier New" panose="02070309020205020404" pitchFamily="49" charset="0"/>
+            </a:endParaRPr>
+          </a:p>
+        </p:txBody>
+      </p:sp>
+      <p:cxnSp>
+        <p:nvCxnSpPr>
+          <p:cNvPr id="759" name="Straight Connector 758"/>
+          <p:cNvCxnSpPr/>
+          <p:nvPr/>
+        </p:nvCxnSpPr>
+        <p:spPr>
+          <a:xfrm flipV="1">
+            <a:off x="16306800" y="12877807"/>
+            <a:ext cx="304800" cy="1"/>
+          </a:xfrm>
+          <a:prstGeom prst="line">
+            <a:avLst/>
+          </a:prstGeom>
+          <a:ln w="12700">
+            <a:solidFill>
+              <a:srgbClr val="000000"/>
+            </a:solidFill>
+            <a:headEnd type="none" w="med" len="med"/>
+            <a:tailEnd type="none" w="med" len="med"/>
+          </a:ln>
+        </p:spPr>
+        <p:style>
+          <a:lnRef idx="1">
+            <a:schemeClr val="accent1"/>
+          </a:lnRef>
+          <a:fillRef idx="0">
+            <a:schemeClr val="accent1"/>
+          </a:fillRef>
+          <a:effectRef idx="0">
+            <a:schemeClr val="accent1"/>
+          </a:effectRef>
+          <a:fontRef idx="minor">
+            <a:schemeClr val="tx1"/>
+          </a:fontRef>
+        </p:style>
+      </p:cxnSp>
+      <p:sp>
+        <p:nvSpPr>
+          <p:cNvPr id="760" name="Rectangle 759"/>
+          <p:cNvSpPr/>
+          <p:nvPr/>
+        </p:nvSpPr>
+        <p:spPr>
+          <a:xfrm>
+            <a:off x="15697200" y="12725400"/>
+            <a:ext cx="457200" cy="152399"/>
+          </a:xfrm>
+          <a:prstGeom prst="rect">
+            <a:avLst/>
+          </a:prstGeom>
+          <a:noFill/>
+          <a:ln>
+            <a:noFill/>
+          </a:ln>
+        </p:spPr>
+        <p:style>
+          <a:lnRef idx="2">
+            <a:schemeClr val="accent1">
+              <a:shade val="50000"/>
+            </a:schemeClr>
+          </a:lnRef>
+          <a:fillRef idx="1">
+            <a:schemeClr val="accent1"/>
+          </a:fillRef>
+          <a:effectRef idx="0">
+            <a:schemeClr val="accent1"/>
+          </a:effectRef>
+          <a:fontRef idx="minor">
+            <a:schemeClr val="lt1"/>
+          </a:fontRef>
+        </p:style>
+        <p:txBody>
+          <a:bodyPr wrap="none" lIns="45720" rIns="45720" rtlCol="0" anchor="ctr"/>
+          <a:lstStyle/>
+          <a:p>
+            <a:r>
+              <a:rPr lang="en-US" sz="900" dirty="0" smtClean="0">
+                <a:solidFill>
+                  <a:srgbClr val="000000"/>
+                </a:solidFill>
+                <a:latin typeface="Courier New" panose="02070309020205020404" pitchFamily="49" charset="0"/>
+                <a:cs typeface="Courier New" panose="02070309020205020404" pitchFamily="49" charset="0"/>
+              </a:rPr>
+              <a:t>7’b1111000</a:t>
+            </a:r>
+            <a:endParaRPr lang="en-US" sz="900" dirty="0">
+              <a:solidFill>
+                <a:srgbClr val="000000"/>
+              </a:solidFill>
+              <a:latin typeface="Courier New" panose="02070309020205020404" pitchFamily="49" charset="0"/>
+              <a:cs typeface="Courier New" panose="02070309020205020404" pitchFamily="49" charset="0"/>
+            </a:endParaRPr>
+          </a:p>
+        </p:txBody>
+      </p:sp>
+      <p:sp>
+        <p:nvSpPr>
+          <p:cNvPr id="761" name="Rectangle 760"/>
+          <p:cNvSpPr/>
+          <p:nvPr/>
+        </p:nvSpPr>
+        <p:spPr>
+          <a:xfrm>
+            <a:off x="15697200" y="12877808"/>
+            <a:ext cx="457200" cy="152399"/>
+          </a:xfrm>
+          <a:prstGeom prst="rect">
+            <a:avLst/>
+          </a:prstGeom>
+          <a:noFill/>
+          <a:ln>
+            <a:noFill/>
+          </a:ln>
+        </p:spPr>
+        <p:style>
+          <a:lnRef idx="2">
+            <a:schemeClr val="accent1">
+              <a:shade val="50000"/>
+            </a:schemeClr>
+          </a:lnRef>
+          <a:fillRef idx="1">
+            <a:schemeClr val="accent1"/>
+          </a:fillRef>
+          <a:effectRef idx="0">
+            <a:schemeClr val="accent1"/>
+          </a:effectRef>
+          <a:fontRef idx="minor">
+            <a:schemeClr val="lt1"/>
+          </a:fontRef>
+        </p:style>
+        <p:txBody>
+          <a:bodyPr wrap="none" lIns="45720" rIns="45720" rtlCol="0" anchor="ctr"/>
+          <a:lstStyle/>
+          <a:p>
+            <a:r>
+              <a:rPr lang="en-US" sz="900" dirty="0" smtClean="0">
+                <a:solidFill>
+                  <a:srgbClr val="000000"/>
+                </a:solidFill>
+                <a:latin typeface="Courier New" panose="02070309020205020404" pitchFamily="49" charset="0"/>
+                <a:cs typeface="Courier New" panose="02070309020205020404" pitchFamily="49" charset="0"/>
+              </a:rPr>
+              <a:t>(t)</a:t>
+            </a:r>
+            <a:endParaRPr lang="en-US" sz="900" dirty="0">
+              <a:solidFill>
+                <a:srgbClr val="000000"/>
+              </a:solidFill>
+              <a:latin typeface="Courier New" panose="02070309020205020404" pitchFamily="49" charset="0"/>
+              <a:cs typeface="Courier New" panose="02070309020205020404" pitchFamily="49" charset="0"/>
+            </a:endParaRPr>
+          </a:p>
+        </p:txBody>
+      </p:sp>
+      <p:cxnSp>
+        <p:nvCxnSpPr>
+          <p:cNvPr id="762" name="Straight Connector 761"/>
+          <p:cNvCxnSpPr/>
+          <p:nvPr/>
+        </p:nvCxnSpPr>
+        <p:spPr>
+          <a:xfrm>
+            <a:off x="15316200" y="10896600"/>
+            <a:ext cx="1295400" cy="0"/>
+          </a:xfrm>
+          <a:prstGeom prst="line">
+            <a:avLst/>
+          </a:prstGeom>
+          <a:ln w="12700">
+            <a:solidFill>
+              <a:srgbClr val="000000"/>
+            </a:solidFill>
+            <a:headEnd type="none" w="med" len="med"/>
+            <a:tailEnd type="none" w="med" len="med"/>
+          </a:ln>
+        </p:spPr>
+        <p:style>
+          <a:lnRef idx="1">
+            <a:schemeClr val="accent1"/>
+          </a:lnRef>
+          <a:fillRef idx="0">
+            <a:schemeClr val="accent1"/>
+          </a:fillRef>
+          <a:effectRef idx="0">
+            <a:schemeClr val="accent1"/>
+          </a:effectRef>
+          <a:fontRef idx="minor">
+            <a:schemeClr val="tx1"/>
+          </a:fontRef>
+        </p:style>
+      </p:cxnSp>
+      <p:cxnSp>
+        <p:nvCxnSpPr>
+          <p:cNvPr id="763" name="Straight Connector 762"/>
+          <p:cNvCxnSpPr/>
+          <p:nvPr/>
+        </p:nvCxnSpPr>
+        <p:spPr>
+          <a:xfrm>
+            <a:off x="15316200" y="10287000"/>
+            <a:ext cx="1295400" cy="0"/>
+          </a:xfrm>
+          <a:prstGeom prst="line">
+            <a:avLst/>
+          </a:prstGeom>
+          <a:ln w="12700">
+            <a:solidFill>
+              <a:srgbClr val="000000"/>
+            </a:solidFill>
+            <a:headEnd type="none" w="med" len="med"/>
+            <a:tailEnd type="none" w="med" len="med"/>
+          </a:ln>
+        </p:spPr>
+        <p:style>
+          <a:lnRef idx="1">
+            <a:schemeClr val="accent1"/>
+          </a:lnRef>
+          <a:fillRef idx="0">
+            <a:schemeClr val="accent1"/>
+          </a:fillRef>
+          <a:effectRef idx="0">
+            <a:schemeClr val="accent1"/>
+          </a:effectRef>
+          <a:fontRef idx="minor">
+            <a:schemeClr val="tx1"/>
+          </a:fontRef>
+        </p:style>
+      </p:cxnSp>
+      <p:cxnSp>
+        <p:nvCxnSpPr>
+          <p:cNvPr id="764" name="Straight Connector 763"/>
+          <p:cNvCxnSpPr/>
+          <p:nvPr/>
+        </p:nvCxnSpPr>
+        <p:spPr>
+          <a:xfrm>
+            <a:off x="15316200" y="13182600"/>
+            <a:ext cx="1295400" cy="0"/>
+          </a:xfrm>
+          <a:prstGeom prst="line">
+            <a:avLst/>
+          </a:prstGeom>
+          <a:ln w="12700">
+            <a:solidFill>
+              <a:srgbClr val="000000"/>
+            </a:solidFill>
+            <a:headEnd type="none" w="med" len="med"/>
+            <a:tailEnd type="none" w="med" len="med"/>
+          </a:ln>
+        </p:spPr>
+        <p:style>
+          <a:lnRef idx="1">
+            <a:schemeClr val="accent1"/>
+          </a:lnRef>
+          <a:fillRef idx="0">
+            <a:schemeClr val="accent1"/>
+          </a:fillRef>
+          <a:effectRef idx="0">
+            <a:schemeClr val="accent1"/>
+          </a:effectRef>
+          <a:fontRef idx="minor">
+            <a:schemeClr val="tx1"/>
+          </a:fontRef>
+        </p:style>
+      </p:cxnSp>
+      <p:cxnSp>
+        <p:nvCxnSpPr>
+          <p:cNvPr id="765" name="Straight Connector 764"/>
+          <p:cNvCxnSpPr/>
+          <p:nvPr/>
+        </p:nvCxnSpPr>
+        <p:spPr>
+          <a:xfrm>
+            <a:off x="15316200" y="12573000"/>
+            <a:ext cx="1295400" cy="0"/>
+          </a:xfrm>
+          <a:prstGeom prst="line">
+            <a:avLst/>
+          </a:prstGeom>
+          <a:ln w="12700">
+            <a:solidFill>
+              <a:srgbClr val="000000"/>
+            </a:solidFill>
+            <a:headEnd type="none" w="med" len="med"/>
+            <a:tailEnd type="none" w="med" len="med"/>
+          </a:ln>
+        </p:spPr>
+        <p:style>
+          <a:lnRef idx="1">
+            <a:schemeClr val="accent1"/>
+          </a:lnRef>
+          <a:fillRef idx="0">
+            <a:schemeClr val="accent1"/>
+          </a:fillRef>
+          <a:effectRef idx="0">
+            <a:schemeClr val="accent1"/>
+          </a:effectRef>
+          <a:fontRef idx="minor">
+            <a:schemeClr val="tx1"/>
+          </a:fontRef>
+        </p:style>
+      </p:cxnSp>
+      <p:sp>
+        <p:nvSpPr>
+          <p:cNvPr id="766" name="Rectangle 765"/>
+          <p:cNvSpPr/>
+          <p:nvPr/>
+        </p:nvSpPr>
+        <p:spPr>
+          <a:xfrm>
+            <a:off x="16611600" y="8686800"/>
+            <a:ext cx="152400" cy="152400"/>
+          </a:xfrm>
+          <a:prstGeom prst="rect">
+            <a:avLst/>
+          </a:prstGeom>
+          <a:noFill/>
+          <a:ln>
+            <a:solidFill>
+              <a:schemeClr val="tx1"/>
+            </a:solidFill>
+          </a:ln>
+        </p:spPr>
+        <p:style>
+          <a:lnRef idx="2">
+            <a:schemeClr val="accent1">
+              <a:shade val="50000"/>
+            </a:schemeClr>
+          </a:lnRef>
+          <a:fillRef idx="1">
+            <a:schemeClr val="accent1"/>
+          </a:fillRef>
+          <a:effectRef idx="0">
+            <a:schemeClr val="accent1"/>
+          </a:effectRef>
+          <a:fontRef idx="minor">
+            <a:schemeClr val="lt1"/>
+          </a:fontRef>
+        </p:style>
+        <p:txBody>
+          <a:bodyPr wrap="none" lIns="45720" rIns="45720" rtlCol="0" anchor="ctr"/>
+          <a:lstStyle/>
+          <a:p>
+            <a:pPr algn="ctr"/>
+            <a:r>
+              <a:rPr lang="en-US" sz="900" dirty="0">
+                <a:solidFill>
+                  <a:srgbClr val="000000"/>
+                </a:solidFill>
+                <a:latin typeface="Courier New" panose="02070309020205020404" pitchFamily="49" charset="0"/>
+                <a:cs typeface="Courier New" panose="02070309020205020404" pitchFamily="49" charset="0"/>
+              </a:rPr>
+              <a:t>=</a:t>
+            </a:r>
+          </a:p>
+        </p:txBody>
+      </p:sp>
+      <p:cxnSp>
+        <p:nvCxnSpPr>
+          <p:cNvPr id="767" name="Straight Connector 766"/>
+          <p:cNvCxnSpPr/>
+          <p:nvPr/>
+        </p:nvCxnSpPr>
+        <p:spPr>
+          <a:xfrm>
+            <a:off x="16687800" y="8458200"/>
+            <a:ext cx="0" cy="228600"/>
+          </a:xfrm>
+          <a:prstGeom prst="line">
+            <a:avLst/>
+          </a:prstGeom>
+          <a:ln w="12700">
+            <a:solidFill>
+              <a:srgbClr val="000000"/>
+            </a:solidFill>
+            <a:headEnd type="none" w="med" len="med"/>
+            <a:tailEnd type="triangle" w="med" len="med"/>
+          </a:ln>
+        </p:spPr>
+        <p:style>
+          <a:lnRef idx="1">
+            <a:schemeClr val="accent1"/>
+          </a:lnRef>
+          <a:fillRef idx="0">
+            <a:schemeClr val="accent1"/>
+          </a:fillRef>
+          <a:effectRef idx="0">
+            <a:schemeClr val="accent1"/>
+          </a:effectRef>
+          <a:fontRef idx="minor">
+            <a:schemeClr val="tx1"/>
+          </a:fontRef>
+        </p:style>
+      </p:cxnSp>
+      <p:sp>
+        <p:nvSpPr>
+          <p:cNvPr id="768" name="Rectangle 767"/>
+          <p:cNvSpPr/>
+          <p:nvPr/>
+        </p:nvSpPr>
+        <p:spPr>
+          <a:xfrm>
+            <a:off x="16535400" y="8305800"/>
+            <a:ext cx="457200" cy="152399"/>
+          </a:xfrm>
+          <a:prstGeom prst="rect">
+            <a:avLst/>
+          </a:prstGeom>
+          <a:noFill/>
+          <a:ln>
+            <a:noFill/>
+          </a:ln>
+        </p:spPr>
+        <p:style>
+          <a:lnRef idx="2">
+            <a:schemeClr val="accent1">
+              <a:shade val="50000"/>
+            </a:schemeClr>
+          </a:lnRef>
+          <a:fillRef idx="1">
+            <a:schemeClr val="accent1"/>
+          </a:fillRef>
+          <a:effectRef idx="0">
+            <a:schemeClr val="accent1"/>
+          </a:effectRef>
+          <a:fontRef idx="minor">
+            <a:schemeClr val="lt1"/>
+          </a:fontRef>
+        </p:style>
+        <p:txBody>
+          <a:bodyPr wrap="none" lIns="45720" rIns="45720" rtlCol="0" anchor="ctr"/>
+          <a:lstStyle/>
+          <a:p>
+            <a:r>
+              <a:rPr lang="en-US" sz="900" dirty="0" smtClean="0">
+                <a:solidFill>
+                  <a:srgbClr val="000000"/>
+                </a:solidFill>
+                <a:latin typeface="Courier New" panose="02070309020205020404" pitchFamily="49" charset="0"/>
+                <a:cs typeface="Courier New" panose="02070309020205020404" pitchFamily="49" charset="0"/>
+              </a:rPr>
+              <a:t>58’d0</a:t>
+            </a:r>
+            <a:endParaRPr lang="en-US" sz="900" dirty="0">
+              <a:solidFill>
+                <a:srgbClr val="000000"/>
+              </a:solidFill>
+              <a:latin typeface="Courier New" panose="02070309020205020404" pitchFamily="49" charset="0"/>
+              <a:cs typeface="Courier New" panose="02070309020205020404" pitchFamily="49" charset="0"/>
+            </a:endParaRPr>
+          </a:p>
+        </p:txBody>
+      </p:sp>
+      <p:cxnSp>
+        <p:nvCxnSpPr>
+          <p:cNvPr id="769" name="Straight Connector 768"/>
+          <p:cNvCxnSpPr>
+            <a:stCxn id="766" idx="2"/>
+          </p:cNvCxnSpPr>
+          <p:nvPr/>
+        </p:nvCxnSpPr>
+        <p:spPr>
+          <a:xfrm>
+            <a:off x="16687800" y="8839200"/>
+            <a:ext cx="0" cy="1143001"/>
+          </a:xfrm>
+          <a:prstGeom prst="line">
+            <a:avLst/>
+          </a:prstGeom>
+          <a:ln w="12700">
+            <a:solidFill>
+              <a:srgbClr val="000000"/>
+            </a:solidFill>
+            <a:headEnd type="none" w="med" len="med"/>
+            <a:tailEnd type="none" w="med" len="med"/>
+          </a:ln>
+        </p:spPr>
+        <p:style>
+          <a:lnRef idx="1">
+            <a:schemeClr val="accent1"/>
+          </a:lnRef>
+          <a:fillRef idx="0">
+            <a:schemeClr val="accent1"/>
+          </a:fillRef>
+          <a:effectRef idx="0">
+            <a:schemeClr val="accent1"/>
+          </a:effectRef>
+          <a:fontRef idx="minor">
+            <a:schemeClr val="tx1"/>
+          </a:fontRef>
+        </p:style>
+      </p:cxnSp>
+      <p:cxnSp>
+        <p:nvCxnSpPr>
+          <p:cNvPr id="770" name="Straight Connector 769"/>
+          <p:cNvCxnSpPr/>
+          <p:nvPr/>
+        </p:nvCxnSpPr>
+        <p:spPr>
+          <a:xfrm>
+            <a:off x="16687800" y="10287000"/>
+            <a:ext cx="0" cy="304801"/>
+          </a:xfrm>
+          <a:prstGeom prst="line">
+            <a:avLst/>
+          </a:prstGeom>
+          <a:ln w="12700">
+            <a:solidFill>
+              <a:srgbClr val="000000"/>
+            </a:solidFill>
+            <a:headEnd type="none" w="med" len="med"/>
+            <a:tailEnd type="none" w="med" len="med"/>
+          </a:ln>
+        </p:spPr>
+        <p:style>
+          <a:lnRef idx="1">
+            <a:schemeClr val="accent1"/>
+          </a:lnRef>
+          <a:fillRef idx="0">
+            <a:schemeClr val="accent1"/>
+          </a:fillRef>
+          <a:effectRef idx="0">
+            <a:schemeClr val="accent1"/>
+          </a:effectRef>
+          <a:fontRef idx="minor">
+            <a:schemeClr val="tx1"/>
+          </a:fontRef>
+        </p:style>
+      </p:cxnSp>
+      <p:cxnSp>
+        <p:nvCxnSpPr>
+          <p:cNvPr id="771" name="Straight Connector 770"/>
+          <p:cNvCxnSpPr/>
+          <p:nvPr/>
+        </p:nvCxnSpPr>
+        <p:spPr>
+          <a:xfrm flipV="1">
+            <a:off x="16611600" y="8991600"/>
+            <a:ext cx="152400" cy="152400"/>
+          </a:xfrm>
+          <a:prstGeom prst="line">
+            <a:avLst/>
+          </a:prstGeom>
+          <a:ln w="12700">
+            <a:solidFill>
+              <a:srgbClr val="000000"/>
+            </a:solidFill>
+            <a:headEnd type="none" w="med" len="med"/>
+            <a:tailEnd type="none" w="med" len="med"/>
+          </a:ln>
+        </p:spPr>
+        <p:style>
+          <a:lnRef idx="1">
+            <a:schemeClr val="accent1"/>
+          </a:lnRef>
+          <a:fillRef idx="0">
+            <a:schemeClr val="accent1"/>
+          </a:fillRef>
+          <a:effectRef idx="0">
+            <a:schemeClr val="accent1"/>
+          </a:effectRef>
+          <a:fontRef idx="minor">
+            <a:schemeClr val="tx1"/>
+          </a:fontRef>
+        </p:style>
+      </p:cxnSp>
+      <p:sp>
+        <p:nvSpPr>
+          <p:cNvPr id="772" name="Rectangle 771"/>
+          <p:cNvSpPr/>
+          <p:nvPr/>
+        </p:nvSpPr>
+        <p:spPr>
+          <a:xfrm>
+            <a:off x="16535400" y="8991600"/>
+            <a:ext cx="152400" cy="76200"/>
+          </a:xfrm>
+          <a:prstGeom prst="rect">
+            <a:avLst/>
+          </a:prstGeom>
+          <a:noFill/>
+          <a:ln>
+            <a:noFill/>
+          </a:ln>
+        </p:spPr>
+        <p:style>
+          <a:lnRef idx="2">
+            <a:schemeClr val="accent1">
+              <a:shade val="50000"/>
+            </a:schemeClr>
+          </a:lnRef>
+          <a:fillRef idx="1">
+            <a:schemeClr val="accent1"/>
+          </a:fillRef>
+          <a:effectRef idx="0">
+            <a:schemeClr val="accent1"/>
+          </a:effectRef>
+          <a:fontRef idx="minor">
+            <a:schemeClr val="lt1"/>
+          </a:fontRef>
+        </p:style>
+        <p:txBody>
+          <a:bodyPr wrap="none" lIns="45720" rIns="45720" rtlCol="0" anchor="ctr"/>
+          <a:lstStyle/>
+          <a:p>
+            <a:pPr algn="ctr"/>
+            <a:r>
+              <a:rPr lang="en-US" sz="900" dirty="0" smtClean="0">
+                <a:solidFill>
+                  <a:srgbClr val="000000"/>
+                </a:solidFill>
+                <a:latin typeface="Courier New" panose="02070309020205020404" pitchFamily="49" charset="0"/>
+                <a:cs typeface="Courier New" panose="02070309020205020404" pitchFamily="49" charset="0"/>
+              </a:rPr>
+              <a:t>1</a:t>
+            </a:r>
+            <a:endParaRPr lang="en-US" sz="900" dirty="0">
+              <a:solidFill>
+                <a:srgbClr val="000000"/>
+              </a:solidFill>
+              <a:latin typeface="Courier New" panose="02070309020205020404" pitchFamily="49" charset="0"/>
+              <a:cs typeface="Courier New" panose="02070309020205020404" pitchFamily="49" charset="0"/>
+            </a:endParaRPr>
+          </a:p>
+        </p:txBody>
+      </p:sp>
+      <p:sp>
+        <p:nvSpPr>
+          <p:cNvPr id="773" name="Rectangle 772"/>
+          <p:cNvSpPr/>
+          <p:nvPr/>
+        </p:nvSpPr>
+        <p:spPr>
+          <a:xfrm rot="5400000">
+            <a:off x="16535400" y="9296400"/>
+            <a:ext cx="457200" cy="152400"/>
+          </a:xfrm>
+          <a:prstGeom prst="rect">
+            <a:avLst/>
+          </a:prstGeom>
+          <a:noFill/>
+          <a:ln>
+            <a:noFill/>
+          </a:ln>
+        </p:spPr>
+        <p:style>
+          <a:lnRef idx="2">
+            <a:schemeClr val="accent1">
+              <a:shade val="50000"/>
+            </a:schemeClr>
+          </a:lnRef>
+          <a:fillRef idx="1">
+            <a:schemeClr val="accent1"/>
+          </a:fillRef>
+          <a:effectRef idx="0">
+            <a:schemeClr val="accent1"/>
+          </a:effectRef>
+          <a:fontRef idx="minor">
+            <a:schemeClr val="lt1"/>
+          </a:fontRef>
+        </p:style>
+        <p:txBody>
+          <a:bodyPr wrap="none" lIns="45720" rIns="45720" rtlCol="0" anchor="ctr"/>
+          <a:lstStyle/>
+          <a:p>
+            <a:r>
+              <a:rPr lang="en-US" sz="900" dirty="0" err="1" smtClean="0">
+                <a:solidFill>
+                  <a:srgbClr val="000000"/>
+                </a:solidFill>
+                <a:latin typeface="Courier New" panose="02070309020205020404" pitchFamily="49" charset="0"/>
+                <a:cs typeface="Courier New" panose="02070309020205020404" pitchFamily="49" charset="0"/>
+              </a:rPr>
+              <a:t>no_data</a:t>
+            </a:r>
+            <a:endParaRPr lang="en-US" sz="900" dirty="0">
+              <a:solidFill>
+                <a:srgbClr val="000000"/>
+              </a:solidFill>
+              <a:latin typeface="Courier New" panose="02070309020205020404" pitchFamily="49" charset="0"/>
+              <a:cs typeface="Courier New" panose="02070309020205020404" pitchFamily="49" charset="0"/>
+            </a:endParaRPr>
+          </a:p>
+        </p:txBody>
+      </p:sp>
+      <p:cxnSp>
+        <p:nvCxnSpPr>
+          <p:cNvPr id="774" name="Straight Connector 773"/>
+          <p:cNvCxnSpPr/>
+          <p:nvPr/>
+        </p:nvCxnSpPr>
+        <p:spPr>
+          <a:xfrm>
+            <a:off x="16687800" y="10896599"/>
+            <a:ext cx="0" cy="1371601"/>
+          </a:xfrm>
+          <a:prstGeom prst="line">
+            <a:avLst/>
+          </a:prstGeom>
+          <a:ln w="12700">
+            <a:solidFill>
+              <a:srgbClr val="000000"/>
+            </a:solidFill>
+            <a:headEnd type="none" w="med" len="med"/>
+            <a:tailEnd type="none" w="med" len="med"/>
+          </a:ln>
+        </p:spPr>
+        <p:style>
+          <a:lnRef idx="1">
+            <a:schemeClr val="accent1"/>
+          </a:lnRef>
+          <a:fillRef idx="0">
+            <a:schemeClr val="accent1"/>
+          </a:fillRef>
+          <a:effectRef idx="0">
+            <a:schemeClr val="accent1"/>
+          </a:effectRef>
+          <a:fontRef idx="minor">
+            <a:schemeClr val="tx1"/>
+          </a:fontRef>
+        </p:style>
+      </p:cxnSp>
+      <p:cxnSp>
+        <p:nvCxnSpPr>
+          <p:cNvPr id="775" name="Straight Connector 774"/>
+          <p:cNvCxnSpPr/>
+          <p:nvPr/>
+        </p:nvCxnSpPr>
+        <p:spPr>
+          <a:xfrm>
+            <a:off x="16687800" y="12573000"/>
+            <a:ext cx="0" cy="304801"/>
+          </a:xfrm>
+          <a:prstGeom prst="line">
+            <a:avLst/>
+          </a:prstGeom>
+          <a:ln w="12700">
+            <a:solidFill>
+              <a:srgbClr val="000000"/>
+            </a:solidFill>
+            <a:headEnd type="none" w="med" len="med"/>
+            <a:tailEnd type="none" w="med" len="med"/>
+          </a:ln>
+        </p:spPr>
+        <p:style>
+          <a:lnRef idx="1">
+            <a:schemeClr val="accent1"/>
+          </a:lnRef>
+          <a:fillRef idx="0">
+            <a:schemeClr val="accent1"/>
+          </a:fillRef>
+          <a:effectRef idx="0">
+            <a:schemeClr val="accent1"/>
+          </a:effectRef>
+          <a:fontRef idx="minor">
+            <a:schemeClr val="tx1"/>
+          </a:fontRef>
+        </p:style>
+      </p:cxnSp>
     </p:spTree>
     <p:extLst>
       <p:ext uri="{BB962C8B-B14F-4D97-AF65-F5344CB8AC3E}">

</xml_diff>

<commit_message>
Typos have been corrected.
</commit_message>
<xml_diff>
--- a/0090_ber/rtl/schematic/ber_7seg.pptx
+++ b/0090_ber/rtl/schematic/ber_7seg.pptx
@@ -27344,6 +27344,602 @@
           </a:fontRef>
         </p:style>
       </p:cxnSp>
+      <p:sp>
+        <p:nvSpPr>
+          <p:cNvPr id="776" name="Rectangle 775"/>
+          <p:cNvSpPr/>
+          <p:nvPr/>
+        </p:nvSpPr>
+        <p:spPr>
+          <a:xfrm>
+            <a:off x="15697200" y="13030200"/>
+            <a:ext cx="457200" cy="152400"/>
+          </a:xfrm>
+          <a:prstGeom prst="rect">
+            <a:avLst/>
+          </a:prstGeom>
+          <a:noFill/>
+          <a:ln>
+            <a:noFill/>
+          </a:ln>
+        </p:spPr>
+        <p:style>
+          <a:lnRef idx="2">
+            <a:schemeClr val="accent1">
+              <a:shade val="50000"/>
+            </a:schemeClr>
+          </a:lnRef>
+          <a:fillRef idx="1">
+            <a:schemeClr val="accent1"/>
+          </a:fillRef>
+          <a:effectRef idx="0">
+            <a:schemeClr val="accent1"/>
+          </a:effectRef>
+          <a:fontRef idx="minor">
+            <a:schemeClr val="lt1"/>
+          </a:fontRef>
+        </p:style>
+        <p:txBody>
+          <a:bodyPr wrap="none" lIns="45720" rIns="45720" rtlCol="0" anchor="ctr"/>
+          <a:lstStyle/>
+          <a:p>
+            <a:r>
+              <a:rPr lang="en-US" sz="900" dirty="0" smtClean="0">
+                <a:solidFill>
+                  <a:srgbClr val="000000"/>
+                </a:solidFill>
+                <a:latin typeface="Courier New" panose="02070309020205020404" pitchFamily="49" charset="0"/>
+                <a:cs typeface="Courier New" panose="02070309020205020404" pitchFamily="49" charset="0"/>
+              </a:rPr>
+              <a:t>dec0</a:t>
+            </a:r>
+            <a:endParaRPr lang="en-US" sz="900" dirty="0">
+              <a:solidFill>
+                <a:srgbClr val="000000"/>
+              </a:solidFill>
+              <a:latin typeface="Courier New" panose="02070309020205020404" pitchFamily="49" charset="0"/>
+              <a:cs typeface="Courier New" panose="02070309020205020404" pitchFamily="49" charset="0"/>
+            </a:endParaRPr>
+          </a:p>
+        </p:txBody>
+      </p:sp>
+      <p:cxnSp>
+        <p:nvCxnSpPr>
+          <p:cNvPr id="777" name="Straight Connector 776"/>
+          <p:cNvCxnSpPr/>
+          <p:nvPr/>
+        </p:nvCxnSpPr>
+        <p:spPr>
+          <a:xfrm flipV="1">
+            <a:off x="15392400" y="13106400"/>
+            <a:ext cx="152400" cy="152400"/>
+          </a:xfrm>
+          <a:prstGeom prst="line">
+            <a:avLst/>
+          </a:prstGeom>
+          <a:ln w="12700">
+            <a:solidFill>
+              <a:srgbClr val="000000"/>
+            </a:solidFill>
+            <a:headEnd type="none" w="med" len="med"/>
+            <a:tailEnd type="none" w="med" len="med"/>
+          </a:ln>
+        </p:spPr>
+        <p:style>
+          <a:lnRef idx="1">
+            <a:schemeClr val="accent1"/>
+          </a:lnRef>
+          <a:fillRef idx="0">
+            <a:schemeClr val="accent1"/>
+          </a:fillRef>
+          <a:effectRef idx="0">
+            <a:schemeClr val="accent1"/>
+          </a:effectRef>
+          <a:fontRef idx="minor">
+            <a:schemeClr val="tx1"/>
+          </a:fontRef>
+        </p:style>
+      </p:cxnSp>
+      <p:sp>
+        <p:nvSpPr>
+          <p:cNvPr id="778" name="Rectangle 777"/>
+          <p:cNvSpPr/>
+          <p:nvPr/>
+        </p:nvSpPr>
+        <p:spPr>
+          <a:xfrm>
+            <a:off x="15392400" y="13030200"/>
+            <a:ext cx="152400" cy="76200"/>
+          </a:xfrm>
+          <a:prstGeom prst="rect">
+            <a:avLst/>
+          </a:prstGeom>
+          <a:noFill/>
+          <a:ln>
+            <a:noFill/>
+          </a:ln>
+        </p:spPr>
+        <p:style>
+          <a:lnRef idx="2">
+            <a:schemeClr val="accent1">
+              <a:shade val="50000"/>
+            </a:schemeClr>
+          </a:lnRef>
+          <a:fillRef idx="1">
+            <a:schemeClr val="accent1"/>
+          </a:fillRef>
+          <a:effectRef idx="0">
+            <a:schemeClr val="accent1"/>
+          </a:effectRef>
+          <a:fontRef idx="minor">
+            <a:schemeClr val="lt1"/>
+          </a:fontRef>
+        </p:style>
+        <p:txBody>
+          <a:bodyPr wrap="none" lIns="45720" rIns="45720" rtlCol="0" anchor="ctr"/>
+          <a:lstStyle/>
+          <a:p>
+            <a:pPr algn="ctr"/>
+            <a:r>
+              <a:rPr lang="en-US" sz="900" dirty="0">
+                <a:solidFill>
+                  <a:srgbClr val="000000"/>
+                </a:solidFill>
+                <a:latin typeface="Courier New" panose="02070309020205020404" pitchFamily="49" charset="0"/>
+                <a:cs typeface="Courier New" panose="02070309020205020404" pitchFamily="49" charset="0"/>
+              </a:rPr>
+              <a:t>7</a:t>
+            </a:r>
+          </a:p>
+        </p:txBody>
+      </p:sp>
+      <p:cxnSp>
+        <p:nvCxnSpPr>
+          <p:cNvPr id="779" name="Straight Connector 778"/>
+          <p:cNvCxnSpPr/>
+          <p:nvPr/>
+        </p:nvCxnSpPr>
+        <p:spPr>
+          <a:xfrm flipV="1">
+            <a:off x="15392400" y="12496800"/>
+            <a:ext cx="152400" cy="152400"/>
+          </a:xfrm>
+          <a:prstGeom prst="line">
+            <a:avLst/>
+          </a:prstGeom>
+          <a:ln w="12700">
+            <a:solidFill>
+              <a:srgbClr val="000000"/>
+            </a:solidFill>
+            <a:headEnd type="none" w="med" len="med"/>
+            <a:tailEnd type="none" w="med" len="med"/>
+          </a:ln>
+        </p:spPr>
+        <p:style>
+          <a:lnRef idx="1">
+            <a:schemeClr val="accent1"/>
+          </a:lnRef>
+          <a:fillRef idx="0">
+            <a:schemeClr val="accent1"/>
+          </a:fillRef>
+          <a:effectRef idx="0">
+            <a:schemeClr val="accent1"/>
+          </a:effectRef>
+          <a:fontRef idx="minor">
+            <a:schemeClr val="tx1"/>
+          </a:fontRef>
+        </p:style>
+      </p:cxnSp>
+      <p:sp>
+        <p:nvSpPr>
+          <p:cNvPr id="780" name="Rectangle 779"/>
+          <p:cNvSpPr/>
+          <p:nvPr/>
+        </p:nvSpPr>
+        <p:spPr>
+          <a:xfrm>
+            <a:off x="15392400" y="12420600"/>
+            <a:ext cx="152400" cy="76200"/>
+          </a:xfrm>
+          <a:prstGeom prst="rect">
+            <a:avLst/>
+          </a:prstGeom>
+          <a:noFill/>
+          <a:ln>
+            <a:noFill/>
+          </a:ln>
+        </p:spPr>
+        <p:style>
+          <a:lnRef idx="2">
+            <a:schemeClr val="accent1">
+              <a:shade val="50000"/>
+            </a:schemeClr>
+          </a:lnRef>
+          <a:fillRef idx="1">
+            <a:schemeClr val="accent1"/>
+          </a:fillRef>
+          <a:effectRef idx="0">
+            <a:schemeClr val="accent1"/>
+          </a:effectRef>
+          <a:fontRef idx="minor">
+            <a:schemeClr val="lt1"/>
+          </a:fontRef>
+        </p:style>
+        <p:txBody>
+          <a:bodyPr wrap="none" lIns="45720" rIns="45720" rtlCol="0" anchor="ctr"/>
+          <a:lstStyle/>
+          <a:p>
+            <a:pPr algn="ctr"/>
+            <a:r>
+              <a:rPr lang="en-US" sz="900" dirty="0">
+                <a:solidFill>
+                  <a:srgbClr val="000000"/>
+                </a:solidFill>
+                <a:latin typeface="Courier New" panose="02070309020205020404" pitchFamily="49" charset="0"/>
+                <a:cs typeface="Courier New" panose="02070309020205020404" pitchFamily="49" charset="0"/>
+              </a:rPr>
+              <a:t>7</a:t>
+            </a:r>
+          </a:p>
+        </p:txBody>
+      </p:sp>
+      <p:cxnSp>
+        <p:nvCxnSpPr>
+          <p:cNvPr id="781" name="Straight Connector 780"/>
+          <p:cNvCxnSpPr/>
+          <p:nvPr/>
+        </p:nvCxnSpPr>
+        <p:spPr>
+          <a:xfrm flipV="1">
+            <a:off x="15392400" y="10820400"/>
+            <a:ext cx="152400" cy="152400"/>
+          </a:xfrm>
+          <a:prstGeom prst="line">
+            <a:avLst/>
+          </a:prstGeom>
+          <a:ln w="12700">
+            <a:solidFill>
+              <a:srgbClr val="000000"/>
+            </a:solidFill>
+            <a:headEnd type="none" w="med" len="med"/>
+            <a:tailEnd type="none" w="med" len="med"/>
+          </a:ln>
+        </p:spPr>
+        <p:style>
+          <a:lnRef idx="1">
+            <a:schemeClr val="accent1"/>
+          </a:lnRef>
+          <a:fillRef idx="0">
+            <a:schemeClr val="accent1"/>
+          </a:fillRef>
+          <a:effectRef idx="0">
+            <a:schemeClr val="accent1"/>
+          </a:effectRef>
+          <a:fontRef idx="minor">
+            <a:schemeClr val="tx1"/>
+          </a:fontRef>
+        </p:style>
+      </p:cxnSp>
+      <p:sp>
+        <p:nvSpPr>
+          <p:cNvPr id="782" name="Rectangle 781"/>
+          <p:cNvSpPr/>
+          <p:nvPr/>
+        </p:nvSpPr>
+        <p:spPr>
+          <a:xfrm>
+            <a:off x="15392400" y="10744200"/>
+            <a:ext cx="152400" cy="76200"/>
+          </a:xfrm>
+          <a:prstGeom prst="rect">
+            <a:avLst/>
+          </a:prstGeom>
+          <a:noFill/>
+          <a:ln>
+            <a:noFill/>
+          </a:ln>
+        </p:spPr>
+        <p:style>
+          <a:lnRef idx="2">
+            <a:schemeClr val="accent1">
+              <a:shade val="50000"/>
+            </a:schemeClr>
+          </a:lnRef>
+          <a:fillRef idx="1">
+            <a:schemeClr val="accent1"/>
+          </a:fillRef>
+          <a:effectRef idx="0">
+            <a:schemeClr val="accent1"/>
+          </a:effectRef>
+          <a:fontRef idx="minor">
+            <a:schemeClr val="lt1"/>
+          </a:fontRef>
+        </p:style>
+        <p:txBody>
+          <a:bodyPr wrap="none" lIns="45720" rIns="45720" rtlCol="0" anchor="ctr"/>
+          <a:lstStyle/>
+          <a:p>
+            <a:pPr algn="ctr"/>
+            <a:r>
+              <a:rPr lang="en-US" sz="900" dirty="0">
+                <a:solidFill>
+                  <a:srgbClr val="000000"/>
+                </a:solidFill>
+                <a:latin typeface="Courier New" panose="02070309020205020404" pitchFamily="49" charset="0"/>
+                <a:cs typeface="Courier New" panose="02070309020205020404" pitchFamily="49" charset="0"/>
+              </a:rPr>
+              <a:t>7</a:t>
+            </a:r>
+          </a:p>
+        </p:txBody>
+      </p:sp>
+      <p:cxnSp>
+        <p:nvCxnSpPr>
+          <p:cNvPr id="783" name="Straight Connector 782"/>
+          <p:cNvCxnSpPr/>
+          <p:nvPr/>
+        </p:nvCxnSpPr>
+        <p:spPr>
+          <a:xfrm flipV="1">
+            <a:off x="15392400" y="10210800"/>
+            <a:ext cx="152400" cy="152400"/>
+          </a:xfrm>
+          <a:prstGeom prst="line">
+            <a:avLst/>
+          </a:prstGeom>
+          <a:ln w="12700">
+            <a:solidFill>
+              <a:srgbClr val="000000"/>
+            </a:solidFill>
+            <a:headEnd type="none" w="med" len="med"/>
+            <a:tailEnd type="none" w="med" len="med"/>
+          </a:ln>
+        </p:spPr>
+        <p:style>
+          <a:lnRef idx="1">
+            <a:schemeClr val="accent1"/>
+          </a:lnRef>
+          <a:fillRef idx="0">
+            <a:schemeClr val="accent1"/>
+          </a:fillRef>
+          <a:effectRef idx="0">
+            <a:schemeClr val="accent1"/>
+          </a:effectRef>
+          <a:fontRef idx="minor">
+            <a:schemeClr val="tx1"/>
+          </a:fontRef>
+        </p:style>
+      </p:cxnSp>
+      <p:sp>
+        <p:nvSpPr>
+          <p:cNvPr id="784" name="Rectangle 783"/>
+          <p:cNvSpPr/>
+          <p:nvPr/>
+        </p:nvSpPr>
+        <p:spPr>
+          <a:xfrm>
+            <a:off x="15392400" y="10134600"/>
+            <a:ext cx="152400" cy="76200"/>
+          </a:xfrm>
+          <a:prstGeom prst="rect">
+            <a:avLst/>
+          </a:prstGeom>
+          <a:noFill/>
+          <a:ln>
+            <a:noFill/>
+          </a:ln>
+        </p:spPr>
+        <p:style>
+          <a:lnRef idx="2">
+            <a:schemeClr val="accent1">
+              <a:shade val="50000"/>
+            </a:schemeClr>
+          </a:lnRef>
+          <a:fillRef idx="1">
+            <a:schemeClr val="accent1"/>
+          </a:fillRef>
+          <a:effectRef idx="0">
+            <a:schemeClr val="accent1"/>
+          </a:effectRef>
+          <a:fontRef idx="minor">
+            <a:schemeClr val="lt1"/>
+          </a:fontRef>
+        </p:style>
+        <p:txBody>
+          <a:bodyPr wrap="none" lIns="45720" rIns="45720" rtlCol="0" anchor="ctr"/>
+          <a:lstStyle/>
+          <a:p>
+            <a:pPr algn="ctr"/>
+            <a:r>
+              <a:rPr lang="en-US" sz="900" dirty="0">
+                <a:solidFill>
+                  <a:srgbClr val="000000"/>
+                </a:solidFill>
+                <a:latin typeface="Courier New" panose="02070309020205020404" pitchFamily="49" charset="0"/>
+                <a:cs typeface="Courier New" panose="02070309020205020404" pitchFamily="49" charset="0"/>
+              </a:rPr>
+              <a:t>7</a:t>
+            </a:r>
+          </a:p>
+        </p:txBody>
+      </p:sp>
+      <p:sp>
+        <p:nvSpPr>
+          <p:cNvPr id="785" name="Rectangle 784"/>
+          <p:cNvSpPr/>
+          <p:nvPr/>
+        </p:nvSpPr>
+        <p:spPr>
+          <a:xfrm>
+            <a:off x="15697200" y="12420600"/>
+            <a:ext cx="457200" cy="152400"/>
+          </a:xfrm>
+          <a:prstGeom prst="rect">
+            <a:avLst/>
+          </a:prstGeom>
+          <a:noFill/>
+          <a:ln>
+            <a:noFill/>
+          </a:ln>
+        </p:spPr>
+        <p:style>
+          <a:lnRef idx="2">
+            <a:schemeClr val="accent1">
+              <a:shade val="50000"/>
+            </a:schemeClr>
+          </a:lnRef>
+          <a:fillRef idx="1">
+            <a:schemeClr val="accent1"/>
+          </a:fillRef>
+          <a:effectRef idx="0">
+            <a:schemeClr val="accent1"/>
+          </a:effectRef>
+          <a:fontRef idx="minor">
+            <a:schemeClr val="lt1"/>
+          </a:fontRef>
+        </p:style>
+        <p:txBody>
+          <a:bodyPr wrap="none" lIns="45720" rIns="45720" rtlCol="0" anchor="ctr"/>
+          <a:lstStyle/>
+          <a:p>
+            <a:r>
+              <a:rPr lang="en-US" sz="900" dirty="0" smtClean="0">
+                <a:solidFill>
+                  <a:srgbClr val="000000"/>
+                </a:solidFill>
+                <a:latin typeface="Courier New" panose="02070309020205020404" pitchFamily="49" charset="0"/>
+                <a:cs typeface="Courier New" panose="02070309020205020404" pitchFamily="49" charset="0"/>
+              </a:rPr>
+              <a:t>dec1</a:t>
+            </a:r>
+            <a:endParaRPr lang="en-US" sz="900" dirty="0">
+              <a:solidFill>
+                <a:srgbClr val="000000"/>
+              </a:solidFill>
+              <a:latin typeface="Courier New" panose="02070309020205020404" pitchFamily="49" charset="0"/>
+              <a:cs typeface="Courier New" panose="02070309020205020404" pitchFamily="49" charset="0"/>
+            </a:endParaRPr>
+          </a:p>
+        </p:txBody>
+      </p:sp>
+      <p:sp>
+        <p:nvSpPr>
+          <p:cNvPr id="786" name="Rectangle 785"/>
+          <p:cNvSpPr/>
+          <p:nvPr/>
+        </p:nvSpPr>
+        <p:spPr>
+          <a:xfrm>
+            <a:off x="15697200" y="10744200"/>
+            <a:ext cx="457200" cy="152400"/>
+          </a:xfrm>
+          <a:prstGeom prst="rect">
+            <a:avLst/>
+          </a:prstGeom>
+          <a:noFill/>
+          <a:ln>
+            <a:noFill/>
+          </a:ln>
+        </p:spPr>
+        <p:style>
+          <a:lnRef idx="2">
+            <a:schemeClr val="accent1">
+              <a:shade val="50000"/>
+            </a:schemeClr>
+          </a:lnRef>
+          <a:fillRef idx="1">
+            <a:schemeClr val="accent1"/>
+          </a:fillRef>
+          <a:effectRef idx="0">
+            <a:schemeClr val="accent1"/>
+          </a:effectRef>
+          <a:fontRef idx="minor">
+            <a:schemeClr val="lt1"/>
+          </a:fontRef>
+        </p:style>
+        <p:txBody>
+          <a:bodyPr wrap="none" lIns="45720" rIns="45720" rtlCol="0" anchor="ctr"/>
+          <a:lstStyle/>
+          <a:p>
+            <a:r>
+              <a:rPr lang="en-US" sz="900" dirty="0" smtClean="0">
+                <a:solidFill>
+                  <a:srgbClr val="000000"/>
+                </a:solidFill>
+                <a:latin typeface="Courier New" panose="02070309020205020404" pitchFamily="49" charset="0"/>
+                <a:cs typeface="Courier New" panose="02070309020205020404" pitchFamily="49" charset="0"/>
+              </a:rPr>
+              <a:t>dec2</a:t>
+            </a:r>
+            <a:endParaRPr lang="en-US" sz="900" dirty="0">
+              <a:solidFill>
+                <a:srgbClr val="000000"/>
+              </a:solidFill>
+              <a:latin typeface="Courier New" panose="02070309020205020404" pitchFamily="49" charset="0"/>
+              <a:cs typeface="Courier New" panose="02070309020205020404" pitchFamily="49" charset="0"/>
+            </a:endParaRPr>
+          </a:p>
+        </p:txBody>
+      </p:sp>
+      <p:sp>
+        <p:nvSpPr>
+          <p:cNvPr id="787" name="Rectangle 786"/>
+          <p:cNvSpPr/>
+          <p:nvPr/>
+        </p:nvSpPr>
+        <p:spPr>
+          <a:xfrm>
+            <a:off x="15697200" y="10134600"/>
+            <a:ext cx="457200" cy="152400"/>
+          </a:xfrm>
+          <a:prstGeom prst="rect">
+            <a:avLst/>
+          </a:prstGeom>
+          <a:noFill/>
+          <a:ln>
+            <a:noFill/>
+          </a:ln>
+        </p:spPr>
+        <p:style>
+          <a:lnRef idx="2">
+            <a:schemeClr val="accent1">
+              <a:shade val="50000"/>
+            </a:schemeClr>
+          </a:lnRef>
+          <a:fillRef idx="1">
+            <a:schemeClr val="accent1"/>
+          </a:fillRef>
+          <a:effectRef idx="0">
+            <a:schemeClr val="accent1"/>
+          </a:effectRef>
+          <a:fontRef idx="minor">
+            <a:schemeClr val="lt1"/>
+          </a:fontRef>
+        </p:style>
+        <p:txBody>
+          <a:bodyPr wrap="none" lIns="45720" rIns="45720" rtlCol="0" anchor="ctr"/>
+          <a:lstStyle/>
+          <a:p>
+            <a:r>
+              <a:rPr lang="en-US" sz="900" smtClean="0">
+                <a:solidFill>
+                  <a:srgbClr val="000000"/>
+                </a:solidFill>
+                <a:latin typeface="Courier New" panose="02070309020205020404" pitchFamily="49" charset="0"/>
+                <a:cs typeface="Courier New" panose="02070309020205020404" pitchFamily="49" charset="0"/>
+              </a:rPr>
+              <a:t>dec3</a:t>
+            </a:r>
+            <a:endParaRPr lang="en-US" sz="900" dirty="0">
+              <a:solidFill>
+                <a:srgbClr val="000000"/>
+              </a:solidFill>
+              <a:latin typeface="Courier New" panose="02070309020205020404" pitchFamily="49" charset="0"/>
+              <a:cs typeface="Courier New" panose="02070309020205020404" pitchFamily="49" charset="0"/>
+            </a:endParaRPr>
+          </a:p>
+        </p:txBody>
+      </p:sp>
     </p:spTree>
     <p:extLst>
       <p:ext uri="{BB962C8B-B14F-4D97-AF65-F5344CB8AC3E}">

</xml_diff>